<commit_message>
Added animation layer function
- Animation Layer Settings

- Implement animation weight
  adjustment function using Slider

- Updated animation layer
  documentation
</commit_message>
<xml_diff>
--- a/Assets/Class/Animation Layer/PPT Data/Animation Layer Example.pptx
+++ b/Assets/Class/Animation Layer/PPT Data/Animation Layer Example.pptx
@@ -2,7 +2,7 @@
 <file path=ppt/presentation.xml><?xml version="1.0" encoding="utf-8"?>
 <p:presentation xmlns:a="http://schemas.openxmlformats.org/drawingml/2006/main" xmlns:r="http://schemas.openxmlformats.org/officeDocument/2006/relationships" xmlns:p="http://schemas.openxmlformats.org/presentationml/2006/main" xmlns:p14="http://schemas.microsoft.com/office/powerpoint/2010/main" saveSubsetFonts="1" firstSlideNum="0">
   <p:sldMasterIdLst>
-    <p:sldMasterId id="2147485434" r:id="rId12"/>
+    <p:sldMasterId id="2147485482" r:id="rId12"/>
   </p:sldMasterIdLst>
   <p:notesMasterIdLst>
     <p:notesMasterId r:id="rId14"/>
@@ -13,6 +13,14 @@
     <p:sldId id="284" r:id="rId18"/>
     <p:sldId id="285" r:id="rId19"/>
     <p:sldId id="286" r:id="rId20"/>
+    <p:sldId id="287" r:id="rId21"/>
+    <p:sldId id="288" r:id="rId22"/>
+    <p:sldId id="289" r:id="rId23"/>
+    <p:sldId id="290" r:id="rId24"/>
+    <p:sldId id="291" r:id="rId25"/>
+    <p:sldId id="292" r:id="rId26"/>
+    <p:sldId id="293" r:id="rId27"/>
+    <p:sldId id="294" r:id="rId28"/>
   </p:sldIdLst>
   <p:sldSz cx="12192000" cy="6858000"/>
   <p:notesSz cx="6858000" cy="9144000"/>
@@ -5619,6 +5627,1910 @@
 </p:sld>
 </file>
 
+<file path=ppt/slides/slide10.xml><?xml version="1.0" encoding="utf-8"?>
+<p:sld xmlns:a="http://schemas.openxmlformats.org/drawingml/2006/main" xmlns:r="http://schemas.openxmlformats.org/officeDocument/2006/relationships" xmlns:p="http://schemas.openxmlformats.org/presentationml/2006/main" xmlns:p14="http://schemas.microsoft.com/office/powerpoint/2010/main">
+  <p:cSld>
+    <p:spTree>
+      <p:nvGrpSpPr>
+        <p:cNvPr id="1" name=""/>
+        <p:cNvGrpSpPr/>
+        <p:nvPr/>
+      </p:nvGrpSpPr>
+      <p:grpSpPr>
+        <a:xfrm>
+          <a:off x="0" y="0"/>
+          <a:ext cx="0" cy="0"/>
+          <a:chOff x="0" y="0"/>
+          <a:chExt cx="0" cy="0"/>
+        </a:xfrm>
+      </p:grpSpPr>
+      <p:sp>
+        <p:nvSpPr>
+          <p:cNvPr id="2" name="Rect 0"/>
+          <p:cNvSpPr txBox="1">
+            <a:spLocks/>
+          </p:cNvSpPr>
+          <p:nvPr/>
+        </p:nvSpPr>
+        <p:spPr>
+          <a:xfrm rot="0">
+            <a:off x="4505960" y="387350"/>
+            <a:ext cx="3184525" cy="554990"/>
+          </a:xfrm>
+          <a:prstGeom prst="rect"/>
+          <a:noFill/>
+          <a:ln w="0">
+            <a:noFill/>
+            <a:prstDash/>
+          </a:ln>
+        </p:spPr>
+        <p:txBody>
+          <a:bodyPr wrap="square" lIns="89535" tIns="46355" rIns="89535" bIns="46355" numCol="1" vert="horz" anchor="t">
+            <a:spAutoFit/>
+          </a:bodyPr>
+          <a:lstStyle/>
+          <a:p>
+            <a:pPr marL="0" indent="0" rtl="0" algn="l" defTabSz="914400" eaLnBrk="1" latinLnBrk="0" hangingPunct="1">
+              <a:buFontTx/>
+              <a:buNone/>
+            </a:pPr>
+            <a:r>
+              <a:rPr lang="ko-KR" sz="3000" b="1">
+                <a:solidFill>
+                  <a:schemeClr val="tx1"/>
+                </a:solidFill>
+                <a:latin typeface="맑은 고딕" charset="0"/>
+                <a:ea typeface="맑은 고딕" charset="0"/>
+              </a:rPr>
+              <a:t>열</a:t>
+            </a:r>
+            <a:r>
+              <a:rPr lang="ko-KR" sz="3000" b="1">
+                <a:solidFill>
+                  <a:schemeClr val="tx1"/>
+                </a:solidFill>
+                <a:latin typeface="맑은 고딕" charset="0"/>
+                <a:ea typeface="맑은 고딕" charset="0"/>
+              </a:rPr>
+              <a:t> 번째 튜토리얼</a:t>
+            </a:r>
+            <a:r>
+              <a:rPr sz="3000" b="1">
+                <a:solidFill>
+                  <a:schemeClr val="tx1"/>
+                </a:solidFill>
+                <a:latin typeface="맑은 고딕" charset="0"/>
+                <a:ea typeface="맑은 고딕" charset="0"/>
+              </a:rPr>
+              <a:t> </a:t>
+            </a:r>
+            <a:endParaRPr lang="ko-KR" altLang="en-US" sz="3000" b="1">
+              <a:solidFill>
+                <a:schemeClr val="tx1"/>
+              </a:solidFill>
+              <a:latin typeface="맑은 고딕" charset="0"/>
+              <a:ea typeface="맑은 고딕" charset="0"/>
+            </a:endParaRPr>
+          </a:p>
+        </p:txBody>
+      </p:sp>
+      <p:sp>
+        <p:nvSpPr>
+          <p:cNvPr id="40" name="Rect 0"/>
+          <p:cNvSpPr txBox="1">
+            <a:spLocks/>
+          </p:cNvSpPr>
+          <p:nvPr/>
+        </p:nvSpPr>
+        <p:spPr>
+          <a:xfrm rot="0">
+            <a:off x="1268095" y="5283835"/>
+            <a:ext cx="4102735" cy="954405"/>
+          </a:xfrm>
+          <a:prstGeom prst="rect"/>
+          <a:noFill/>
+          <a:ln w="0">
+            <a:noFill/>
+            <a:prstDash/>
+          </a:ln>
+        </p:spPr>
+        <p:txBody>
+          <a:bodyPr wrap="square" lIns="89535" tIns="46355" rIns="89535" bIns="46355" numCol="1" vert="horz" anchor="t">
+            <a:spAutoFit/>
+          </a:bodyPr>
+          <a:lstStyle/>
+          <a:p>
+            <a:pPr marL="0" indent="0" rtl="0" algn="l" defTabSz="914400" eaLnBrk="1" latinLnBrk="0" hangingPunct="1">
+              <a:buFontTx/>
+              <a:buNone/>
+            </a:pPr>
+            <a:r>
+              <a:rPr sz="2000" b="1">
+                <a:solidFill>
+                  <a:srgbClr val="0611F2"/>
+                </a:solidFill>
+                <a:latin typeface="맑은 고딕" charset="0"/>
+                <a:ea typeface="맑은 고딕" charset="0"/>
+              </a:rPr>
+              <a:t>26</a:t>
+            </a:r>
+            <a:r>
+              <a:rPr sz="2000" b="1">
+                <a:solidFill>
+                  <a:srgbClr val="0611F2"/>
+                </a:solidFill>
+                <a:latin typeface="맑은 고딕" charset="0"/>
+                <a:ea typeface="맑은 고딕" charset="0"/>
+              </a:rPr>
+              <a:t>. </a:t>
+            </a:r>
+            <a:r>
+              <a:rPr sz="1800">
+                <a:latin typeface="맑은 고딕" charset="0"/>
+                <a:ea typeface="맑은 고딕" charset="0"/>
+              </a:rPr>
+              <a:t>이</a:t>
+            </a:r>
+            <a:r>
+              <a:rPr lang="ko-KR" sz="1800">
+                <a:latin typeface="맑은 고딕" charset="0"/>
+                <a:ea typeface="맑은 고딕" charset="0"/>
+              </a:rPr>
+              <a:t>제</a:t>
+            </a:r>
+            <a:r>
+              <a:rPr lang="ko-KR" sz="1800">
+                <a:latin typeface="맑은 고딕" charset="0"/>
+                <a:ea typeface="맑은 고딕" charset="0"/>
+              </a:rPr>
+              <a:t> erika_archer@</a:t>
+            </a:r>
+            <a:r>
+              <a:rPr lang="ko-KR" sz="1800">
+                <a:latin typeface="맑은 고딕" charset="0"/>
+                <a:ea typeface="맑은 고딕" charset="0"/>
+              </a:rPr>
+              <a:t>Injured Run</a:t>
+            </a:r>
+            <a:r>
+              <a:rPr lang="ko-KR" sz="1800">
+                <a:latin typeface="맑은 고딕" charset="0"/>
+                <a:ea typeface="맑은 고딕" charset="0"/>
+              </a:rPr>
+              <a:t> 애니메이션 파일의 이름 </a:t>
+            </a:r>
+            <a:r>
+              <a:rPr lang="ko-KR" sz="1800">
+                <a:latin typeface="맑은 고딕" charset="0"/>
+                <a:ea typeface="맑은 고딕" charset="0"/>
+              </a:rPr>
+              <a:t>Injured Run</a:t>
+            </a:r>
+            <a:r>
+              <a:rPr lang="ko-KR" sz="1800">
+                <a:latin typeface="맑은 고딕" charset="0"/>
+                <a:ea typeface="맑은 고딕" charset="0"/>
+              </a:rPr>
+              <a:t>이라는 이름으로 정의합니다.</a:t>
+            </a:r>
+            <a:endParaRPr lang="ko-KR" altLang="en-US" sz="1800">
+              <a:latin typeface="맑은 고딕" charset="0"/>
+              <a:ea typeface="맑은 고딕" charset="0"/>
+            </a:endParaRPr>
+          </a:p>
+        </p:txBody>
+      </p:sp>
+      <p:pic>
+        <p:nvPicPr>
+          <p:cNvPr id="44" name="그림 18" descr="C:/Users/Admin1/AppData/Roaming/PolarisOffice/ETemp/11920_6069152/fImage202401999169.png"/>
+          <p:cNvPicPr>
+            <a:picLocks noChangeAspect="1"/>
+          </p:cNvPicPr>
+          <p:nvPr/>
+        </p:nvPicPr>
+        <p:blipFill rotWithShape="1">
+          <a:blip r:embed="rId2" cstate="hqprint">
+            <a:extLst>
+              <a:ext uri="{28A0092B-C50C-407E-A947-70E740481C1C}">
+                <a14:useLocalDpi xmlns:a14="http://schemas.microsoft.com/office/drawing/2010/main"/>
+              </a:ext>
+            </a:extLst>
+          </a:blip>
+          <a:stretch>
+            <a:fillRect/>
+          </a:stretch>
+        </p:blipFill>
+        <p:spPr>
+          <a:xfrm rot="0">
+            <a:off x="1282065" y="1254760"/>
+            <a:ext cx="4089400" cy="3950335"/>
+          </a:xfrm>
+          <a:prstGeom prst="rect"/>
+          <a:noFill/>
+        </p:spPr>
+      </p:pic>
+      <p:sp>
+        <p:nvSpPr>
+          <p:cNvPr id="46" name="텍스트 상자 3"/>
+          <p:cNvSpPr txBox="1">
+            <a:spLocks/>
+          </p:cNvSpPr>
+          <p:nvPr/>
+        </p:nvSpPr>
+        <p:spPr>
+          <a:xfrm rot="0">
+            <a:off x="6817995" y="2853055"/>
+            <a:ext cx="4363720" cy="954405"/>
+          </a:xfrm>
+          <a:prstGeom prst="rect"/>
+          <a:noFill/>
+          <a:ln w="0">
+            <a:noFill/>
+            <a:prstDash/>
+          </a:ln>
+        </p:spPr>
+        <p:txBody>
+          <a:bodyPr wrap="square" lIns="89535" tIns="46355" rIns="89535" bIns="46355" numCol="1" vert="horz" anchor="t">
+            <a:spAutoFit/>
+          </a:bodyPr>
+          <a:lstStyle/>
+          <a:p>
+            <a:pPr marL="0" indent="0" rtl="0" algn="l" defTabSz="914400" eaLnBrk="1" latinLnBrk="0" hangingPunct="1">
+              <a:buFontTx/>
+              <a:buNone/>
+            </a:pPr>
+            <a:r>
+              <a:rPr sz="2000" b="1">
+                <a:solidFill>
+                  <a:srgbClr val="0611F2"/>
+                </a:solidFill>
+                <a:latin typeface="맑은 고딕" charset="0"/>
+                <a:ea typeface="맑은 고딕" charset="0"/>
+              </a:rPr>
+              <a:t>2</a:t>
+            </a:r>
+            <a:r>
+              <a:rPr sz="2000" b="1">
+                <a:solidFill>
+                  <a:srgbClr val="0611F2"/>
+                </a:solidFill>
+                <a:latin typeface="맑은 고딕" charset="0"/>
+                <a:ea typeface="맑은 고딕" charset="0"/>
+              </a:rPr>
+              <a:t>7</a:t>
+            </a:r>
+            <a:r>
+              <a:rPr sz="2000" b="1">
+                <a:solidFill>
+                  <a:srgbClr val="0611F2"/>
+                </a:solidFill>
+                <a:latin typeface="맑은 고딕" charset="0"/>
+                <a:ea typeface="맑은 고딕" charset="0"/>
+              </a:rPr>
+              <a:t>. </a:t>
+            </a:r>
+            <a:r>
+              <a:rPr sz="1800">
+                <a:latin typeface="맑은 고딕" charset="0"/>
+                <a:ea typeface="맑은 고딕" charset="0"/>
+              </a:rPr>
+              <a:t>그</a:t>
+            </a:r>
+            <a:r>
+              <a:rPr lang="ko-KR" sz="1800">
+                <a:latin typeface="맑은 고딕" charset="0"/>
+                <a:ea typeface="맑은 고딕" charset="0"/>
+              </a:rPr>
+              <a:t>런 다음</a:t>
+            </a:r>
+            <a:r>
+              <a:rPr lang="ko-KR" sz="1800">
+                <a:latin typeface="맑은 고딕" charset="0"/>
+                <a:ea typeface="맑은 고딕" charset="0"/>
+              </a:rPr>
+              <a:t> </a:t>
+            </a:r>
+            <a:r>
+              <a:rPr lang="ko-KR" sz="1800">
+                <a:latin typeface="맑은 고딕" charset="0"/>
+                <a:ea typeface="맑은 고딕" charset="0"/>
+              </a:rPr>
+              <a:t>Other Layer의 설정에 Sync를 선택하고 Base Layer와 동기화를 시켜줍니다.</a:t>
+            </a:r>
+            <a:endParaRPr lang="ko-KR" altLang="en-US" sz="1800">
+              <a:latin typeface="맑은 고딕" charset="0"/>
+              <a:ea typeface="맑은 고딕" charset="0"/>
+            </a:endParaRPr>
+          </a:p>
+        </p:txBody>
+      </p:sp>
+      <p:pic>
+        <p:nvPicPr>
+          <p:cNvPr id="47" name="그림 4" descr="C:/Users/Admin1/AppData/Roaming/PolarisOffice/ETemp/11920_6069152/fImage1989611641.png"/>
+          <p:cNvPicPr>
+            <a:picLocks noChangeAspect="1"/>
+          </p:cNvPicPr>
+          <p:nvPr/>
+        </p:nvPicPr>
+        <p:blipFill rotWithShape="1">
+          <a:blip r:embed="rId4" cstate="print">
+            <a:extLst>
+              <a:ext uri="{28A0092B-C50C-407E-A947-70E740481C1C}">
+                <a14:useLocalDpi xmlns:a14="http://schemas.microsoft.com/office/drawing/2010/main" val="0"/>
+              </a:ext>
+            </a:extLst>
+          </a:blip>
+          <a:stretch>
+            <a:fillRect/>
+          </a:stretch>
+        </p:blipFill>
+        <p:spPr>
+          <a:xfrm rot="0">
+            <a:off x="6816725" y="1255395"/>
+            <a:ext cx="4364990" cy="1513205"/>
+          </a:xfrm>
+          <a:prstGeom prst="roundRect"/>
+          <a:solidFill>
+            <a:srgbClr val="EDEDED"/>
+          </a:solidFill>
+        </p:spPr>
+      </p:pic>
+      <p:pic>
+        <p:nvPicPr>
+          <p:cNvPr id="48" name="그림 25" descr="C:/Users/Admin1/AppData/Roaming/PolarisOffice/ETemp/11920_6069152/fImage154882068467.png"/>
+          <p:cNvPicPr>
+            <a:picLocks noChangeAspect="1"/>
+          </p:cNvPicPr>
+          <p:nvPr/>
+        </p:nvPicPr>
+        <p:blipFill rotWithShape="1">
+          <a:blip r:embed="rId5" cstate="print">
+            <a:extLst>
+              <a:ext uri="{28A0092B-C50C-407E-A947-70E740481C1C}">
+                <a14:useLocalDpi xmlns:a14="http://schemas.microsoft.com/office/drawing/2010/main" val="0"/>
+              </a:ext>
+            </a:extLst>
+          </a:blip>
+          <a:stretch>
+            <a:fillRect/>
+          </a:stretch>
+        </p:blipFill>
+        <p:spPr>
+          <a:xfrm rot="0">
+            <a:off x="6819265" y="3935095"/>
+            <a:ext cx="4370705" cy="1543685"/>
+          </a:xfrm>
+          <a:prstGeom prst="roundRect"/>
+          <a:solidFill>
+            <a:srgbClr val="EDEDED"/>
+          </a:solidFill>
+        </p:spPr>
+      </p:pic>
+      <p:sp>
+        <p:nvSpPr>
+          <p:cNvPr id="49" name="텍스트 상자 28"/>
+          <p:cNvSpPr txBox="1">
+            <a:spLocks/>
+          </p:cNvSpPr>
+          <p:nvPr/>
+        </p:nvSpPr>
+        <p:spPr>
+          <a:xfrm rot="0">
+            <a:off x="6814820" y="5560060"/>
+            <a:ext cx="4363720" cy="677545"/>
+          </a:xfrm>
+          <a:prstGeom prst="rect"/>
+          <a:noFill/>
+          <a:ln w="0">
+            <a:noFill/>
+            <a:prstDash/>
+          </a:ln>
+        </p:spPr>
+        <p:txBody>
+          <a:bodyPr wrap="square" lIns="89535" tIns="46355" rIns="89535" bIns="46355" numCol="1" vert="horz" anchor="t">
+            <a:spAutoFit/>
+          </a:bodyPr>
+          <a:lstStyle/>
+          <a:p>
+            <a:pPr marL="0" indent="0" rtl="0" algn="l" defTabSz="914400" eaLnBrk="1" latinLnBrk="0" hangingPunct="1">
+              <a:buFontTx/>
+              <a:buNone/>
+            </a:pPr>
+            <a:r>
+              <a:rPr sz="2000" b="1">
+                <a:solidFill>
+                  <a:srgbClr val="0611F2"/>
+                </a:solidFill>
+                <a:latin typeface="맑은 고딕" charset="0"/>
+                <a:ea typeface="맑은 고딕" charset="0"/>
+              </a:rPr>
+              <a:t>2</a:t>
+            </a:r>
+            <a:r>
+              <a:rPr lang="ko-KR" sz="2000" b="1">
+                <a:solidFill>
+                  <a:srgbClr val="0611F2"/>
+                </a:solidFill>
+                <a:latin typeface="맑은 고딕" charset="0"/>
+                <a:ea typeface="맑은 고딕" charset="0"/>
+              </a:rPr>
+              <a:t>8</a:t>
+            </a:r>
+            <a:r>
+              <a:rPr sz="2000" b="1">
+                <a:solidFill>
+                  <a:srgbClr val="0611F2"/>
+                </a:solidFill>
+                <a:latin typeface="맑은 고딕" charset="0"/>
+                <a:ea typeface="맑은 고딕" charset="0"/>
+              </a:rPr>
+              <a:t>. </a:t>
+            </a:r>
+            <a:r>
+              <a:rPr lang="ko-KR" sz="1800">
+                <a:latin typeface="맑은 고딕" charset="0"/>
+                <a:ea typeface="맑은 고딕" charset="0"/>
+              </a:rPr>
+              <a:t>그리고 Erika Archer 오브젝트의 위치와 회전 값을 초기화합니다.</a:t>
+            </a:r>
+            <a:endParaRPr lang="ko-KR" altLang="en-US" sz="1800">
+              <a:latin typeface="맑은 고딕" charset="0"/>
+              <a:ea typeface="맑은 고딕" charset="0"/>
+            </a:endParaRPr>
+          </a:p>
+        </p:txBody>
+      </p:sp>
+    </p:spTree>
+  </p:cSld>
+  <p:clrMapOvr>
+    <a:masterClrMapping/>
+  </p:clrMapOvr>
+  <mc:AlternateContent xmlns:mc="http://schemas.openxmlformats.org/markup-compatibility/2006">
+    <mc:Choice xmlns:p14="http://schemas.microsoft.com/office/powerpoint/2010/main" Requires="p14">
+      <p:transition spd="slow" p14:dur="1000"/>
+    </mc:Choice>
+    <mc:Fallback>
+      <p:transition spd="slow"/>
+    </mc:Fallback>
+  </mc:AlternateContent>
+  <p:timing>
+    <p:tnLst>
+      <p:par>
+        <p:cTn id="1" dur="indefinite" restart="never" nodeType="tmRoot"/>
+      </p:par>
+    </p:tnLst>
+  </p:timing>
+</p:sld>
+</file>
+
+<file path=ppt/slides/slide11.xml><?xml version="1.0" encoding="utf-8"?>
+<p:sld xmlns:a="http://schemas.openxmlformats.org/drawingml/2006/main" xmlns:r="http://schemas.openxmlformats.org/officeDocument/2006/relationships" xmlns:p="http://schemas.openxmlformats.org/presentationml/2006/main">
+  <p:cSld>
+    <p:spTree>
+      <p:nvGrpSpPr>
+        <p:cNvPr id="1" name=""/>
+        <p:cNvGrpSpPr/>
+        <p:nvPr/>
+      </p:nvGrpSpPr>
+      <p:grpSpPr>
+        <a:xfrm>
+          <a:off x="0" y="0"/>
+          <a:ext cx="0" cy="0"/>
+          <a:chOff x="0" y="0"/>
+          <a:chExt cx="0" cy="0"/>
+        </a:xfrm>
+      </p:grpSpPr>
+      <p:sp>
+        <p:nvSpPr>
+          <p:cNvPr id="2" name="Rect 0"/>
+          <p:cNvSpPr txBox="1">
+            <a:spLocks/>
+          </p:cNvSpPr>
+          <p:nvPr/>
+        </p:nvSpPr>
+        <p:spPr>
+          <a:xfrm rot="0">
+            <a:off x="4298315" y="362585"/>
+            <a:ext cx="3624580" cy="554990"/>
+          </a:xfrm>
+          <a:prstGeom prst="rect"/>
+          <a:noFill/>
+          <a:ln w="0">
+            <a:noFill/>
+            <a:prstDash/>
+          </a:ln>
+        </p:spPr>
+        <p:txBody>
+          <a:bodyPr wrap="square" lIns="89535" tIns="46355" rIns="89535" bIns="46355" numCol="1" vert="horz" anchor="t">
+            <a:spAutoFit/>
+          </a:bodyPr>
+          <a:lstStyle/>
+          <a:p>
+            <a:pPr marL="0" indent="0" rtl="0" algn="l" defTabSz="914400" eaLnBrk="1" latinLnBrk="0" hangingPunct="1">
+              <a:buFontTx/>
+              <a:buNone/>
+            </a:pPr>
+            <a:r>
+              <a:rPr lang="ko-KR" sz="3000" b="1">
+                <a:solidFill>
+                  <a:schemeClr val="tx1"/>
+                </a:solidFill>
+                <a:latin typeface="맑은 고딕" charset="0"/>
+                <a:ea typeface="맑은 고딕" charset="0"/>
+              </a:rPr>
+              <a:t>열</a:t>
+            </a:r>
+            <a:r>
+              <a:rPr lang="ko-KR" sz="3000" b="1">
+                <a:solidFill>
+                  <a:schemeClr val="tx1"/>
+                </a:solidFill>
+                <a:latin typeface="맑은 고딕" charset="0"/>
+                <a:ea typeface="맑은 고딕" charset="0"/>
+              </a:rPr>
+              <a:t>한</a:t>
+            </a:r>
+            <a:r>
+              <a:rPr lang="ko-KR" sz="3000" b="1">
+                <a:solidFill>
+                  <a:schemeClr val="tx1"/>
+                </a:solidFill>
+                <a:latin typeface="맑은 고딕" charset="0"/>
+                <a:ea typeface="맑은 고딕" charset="0"/>
+              </a:rPr>
+              <a:t> 번째 튜토리얼</a:t>
+            </a:r>
+            <a:r>
+              <a:rPr sz="3000" b="1">
+                <a:solidFill>
+                  <a:schemeClr val="tx1"/>
+                </a:solidFill>
+                <a:latin typeface="맑은 고딕" charset="0"/>
+                <a:ea typeface="맑은 고딕" charset="0"/>
+              </a:rPr>
+              <a:t> </a:t>
+            </a:r>
+            <a:endParaRPr lang="ko-KR" altLang="en-US" sz="3000" b="1">
+              <a:solidFill>
+                <a:schemeClr val="tx1"/>
+              </a:solidFill>
+              <a:latin typeface="맑은 고딕" charset="0"/>
+              <a:ea typeface="맑은 고딕" charset="0"/>
+            </a:endParaRPr>
+          </a:p>
+        </p:txBody>
+      </p:sp>
+      <p:sp>
+        <p:nvSpPr>
+          <p:cNvPr id="40" name="Rect 0"/>
+          <p:cNvSpPr txBox="1">
+            <a:spLocks/>
+          </p:cNvSpPr>
+          <p:nvPr/>
+        </p:nvSpPr>
+        <p:spPr>
+          <a:xfrm rot="0">
+            <a:off x="1268095" y="4942840"/>
+            <a:ext cx="4102735" cy="1200785"/>
+          </a:xfrm>
+          <a:prstGeom prst="rect"/>
+          <a:noFill/>
+          <a:ln w="0">
+            <a:noFill/>
+            <a:prstDash/>
+          </a:ln>
+        </p:spPr>
+        <p:txBody>
+          <a:bodyPr wrap="square" lIns="89535" tIns="46355" rIns="89535" bIns="46355" numCol="1" vert="horz" anchor="t">
+            <a:spAutoFit/>
+          </a:bodyPr>
+          <a:lstStyle/>
+          <a:p>
+            <a:pPr marL="0" indent="0" rtl="0" algn="l" defTabSz="914400" eaLnBrk="1" latinLnBrk="0" hangingPunct="1">
+              <a:buFontTx/>
+              <a:buNone/>
+            </a:pPr>
+            <a:r>
+              <a:rPr lang="ko-KR" sz="1800">
+                <a:latin typeface="맑은 고딕" charset="0"/>
+                <a:ea typeface="맑은 고딕" charset="0"/>
+              </a:rPr>
+              <a:t>애니메이션 레이어란?</a:t>
+            </a:r>
+            <a:endParaRPr lang="ko-KR" altLang="en-US" sz="1800">
+              <a:latin typeface="맑은 고딕" charset="0"/>
+              <a:ea typeface="맑은 고딕" charset="0"/>
+            </a:endParaRPr>
+          </a:p>
+          <a:p>
+            <a:pPr marL="0" indent="0" rtl="0" algn="l" defTabSz="914400" eaLnBrk="1" latinLnBrk="0" hangingPunct="1">
+              <a:buFontTx/>
+              <a:buNone/>
+            </a:pPr>
+            <a:r>
+              <a:rPr lang="ko-KR" sz="1800">
+                <a:latin typeface="맑은 고딕" charset="0"/>
+                <a:ea typeface="맑은 고딕" charset="0"/>
+              </a:rPr>
+              <a:t>여러 개의 애니메이션 그룹을 가중치에 따라 우선 순위로 동작하는 기법입니다.</a:t>
+            </a:r>
+            <a:endParaRPr lang="ko-KR" altLang="en-US" sz="1800">
+              <a:latin typeface="맑은 고딕" charset="0"/>
+              <a:ea typeface="맑은 고딕" charset="0"/>
+            </a:endParaRPr>
+          </a:p>
+        </p:txBody>
+      </p:sp>
+      <p:pic>
+        <p:nvPicPr>
+          <p:cNvPr id="41" name="그림 15" descr="C:/Users/Admin1/AppData/Roaming/PolarisOffice/ETemp/11920_6069152/fImage3269531986334.png"/>
+          <p:cNvPicPr>
+            <a:picLocks noChangeAspect="1"/>
+          </p:cNvPicPr>
+          <p:nvPr/>
+        </p:nvPicPr>
+        <p:blipFill rotWithShape="1">
+          <a:blip r:embed="rId2" cstate="print">
+            <a:extLst>
+              <a:ext uri="{28A0092B-C50C-407E-A947-70E740481C1C}">
+                <a14:useLocalDpi xmlns:a14="http://schemas.microsoft.com/office/drawing/2010/main" val="0"/>
+              </a:ext>
+            </a:extLst>
+          </a:blip>
+          <a:stretch>
+            <a:fillRect/>
+          </a:stretch>
+        </p:blipFill>
+        <p:spPr>
+          <a:xfrm rot="0">
+            <a:off x="1271905" y="1280160"/>
+            <a:ext cx="4107180" cy="3455035"/>
+          </a:xfrm>
+          <a:prstGeom prst="roundRect"/>
+          <a:solidFill>
+            <a:srgbClr val="EDEDED"/>
+          </a:solidFill>
+        </p:spPr>
+      </p:pic>
+      <p:pic>
+        <p:nvPicPr>
+          <p:cNvPr id="42" name="그림 29" descr="C:/Users/Admin1/AppData/Roaming/PolarisOffice/ETemp/11920_6069152/fImage176252086500.png"/>
+          <p:cNvPicPr>
+            <a:picLocks noChangeAspect="1"/>
+          </p:cNvPicPr>
+          <p:nvPr/>
+        </p:nvPicPr>
+        <p:blipFill rotWithShape="1">
+          <a:blip r:embed="rId3" cstate="print">
+            <a:extLst>
+              <a:ext uri="{28A0092B-C50C-407E-A947-70E740481C1C}">
+                <a14:useLocalDpi xmlns:a14="http://schemas.microsoft.com/office/drawing/2010/main" val="0"/>
+              </a:ext>
+            </a:extLst>
+          </a:blip>
+          <a:stretch>
+            <a:fillRect/>
+          </a:stretch>
+        </p:blipFill>
+        <p:spPr>
+          <a:xfrm rot="0">
+            <a:off x="6824980" y="1276985"/>
+            <a:ext cx="4306570" cy="2431415"/>
+          </a:xfrm>
+          <a:prstGeom prst="roundRect"/>
+          <a:solidFill>
+            <a:srgbClr val="EDEDED"/>
+          </a:solidFill>
+        </p:spPr>
+      </p:pic>
+      <p:pic>
+        <p:nvPicPr>
+          <p:cNvPr id="43" name="그림 30" descr="C:/Users/Admin1/AppData/Roaming/PolarisOffice/ETemp/11920_6069152/fImage107672099169.png"/>
+          <p:cNvPicPr>
+            <a:picLocks noChangeAspect="1"/>
+          </p:cNvPicPr>
+          <p:nvPr/>
+        </p:nvPicPr>
+        <p:blipFill rotWithShape="1">
+          <a:blip r:embed="rId4" cstate="print">
+            <a:extLst>
+              <a:ext uri="{28A0092B-C50C-407E-A947-70E740481C1C}">
+                <a14:useLocalDpi xmlns:a14="http://schemas.microsoft.com/office/drawing/2010/main" val="0"/>
+              </a:ext>
+            </a:extLst>
+          </a:blip>
+          <a:stretch>
+            <a:fillRect/>
+          </a:stretch>
+        </p:blipFill>
+        <p:spPr>
+          <a:xfrm rot="0">
+            <a:off x="6824980" y="3823970"/>
+            <a:ext cx="4306570" cy="981710"/>
+          </a:xfrm>
+          <a:prstGeom prst="roundRect"/>
+          <a:solidFill>
+            <a:srgbClr val="EDEDED"/>
+          </a:solidFill>
+        </p:spPr>
+      </p:pic>
+      <p:sp>
+        <p:nvSpPr>
+          <p:cNvPr id="44" name="텍스트 상자 35"/>
+          <p:cNvSpPr txBox="1">
+            <a:spLocks/>
+          </p:cNvSpPr>
+          <p:nvPr/>
+        </p:nvSpPr>
+        <p:spPr>
+          <a:xfrm rot="0">
+            <a:off x="6844030" y="4946015"/>
+            <a:ext cx="4287520" cy="1138555"/>
+          </a:xfrm>
+          <a:prstGeom prst="rect"/>
+          <a:noFill/>
+        </p:spPr>
+        <p:txBody>
+          <a:bodyPr wrap="square" lIns="0" tIns="0" rIns="0" bIns="0" vert="horz" anchor="t">
+            <a:noAutofit/>
+          </a:bodyPr>
+          <a:lstStyle/>
+          <a:p>
+            <a:pPr marL="0" indent="0" rtl="0" algn="l" defTabSz="914400" eaLnBrk="1" latinLnBrk="0" hangingPunct="1">
+              <a:buFontTx/>
+              <a:buNone/>
+            </a:pPr>
+            <a:r>
+              <a:rPr sz="2000" b="1">
+                <a:solidFill>
+                  <a:srgbClr val="0611F2"/>
+                </a:solidFill>
+                <a:latin typeface="맑은 고딕" charset="0"/>
+                <a:ea typeface="맑은 고딕" charset="0"/>
+              </a:rPr>
+              <a:t>2</a:t>
+            </a:r>
+            <a:r>
+              <a:rPr lang="ko-KR" sz="2000" b="1">
+                <a:solidFill>
+                  <a:srgbClr val="0611F2"/>
+                </a:solidFill>
+                <a:latin typeface="맑은 고딕" charset="0"/>
+                <a:ea typeface="맑은 고딕" charset="0"/>
+              </a:rPr>
+              <a:t>9</a:t>
+            </a:r>
+            <a:r>
+              <a:rPr sz="2000" b="1">
+                <a:solidFill>
+                  <a:srgbClr val="0611F2"/>
+                </a:solidFill>
+                <a:latin typeface="맑은 고딕" charset="0"/>
+                <a:ea typeface="맑은 고딕" charset="0"/>
+              </a:rPr>
+              <a:t>. </a:t>
+            </a:r>
+            <a:r>
+              <a:rPr lang="ko-KR" sz="1800">
+                <a:latin typeface="맑은 고딕" charset="0"/>
+                <a:ea typeface="맑은 고딕" charset="0"/>
+              </a:rPr>
+              <a:t>그다음으로 Project 폴더에 있는 Animation 폴더에 Injured Run 애니메이션 클립을 Other Layer에 있는 Running 애니메이션에 넣어줍니다.</a:t>
+            </a:r>
+            <a:endParaRPr lang="ko-KR" altLang="en-US" sz="1800">
+              <a:latin typeface="맑은 고딕" charset="0"/>
+              <a:ea typeface="맑은 고딕" charset="0"/>
+            </a:endParaRPr>
+          </a:p>
+        </p:txBody>
+      </p:sp>
+      <p:cxnSp>
+        <p:nvCxnSpPr>
+          <p:cNvPr id="45" name="도형 36"/>
+          <p:cNvCxnSpPr/>
+          <p:nvPr/>
+        </p:nvCxnSpPr>
+        <p:spPr>
+          <a:xfrm rot="0" flipV="1">
+            <a:off x="9892665" y="1828800"/>
+            <a:ext cx="1139190" cy="2353310"/>
+          </a:xfrm>
+          <a:prstGeom prst="straightConnector1"/>
+          <a:ln w="6350" cap="flat" cmpd="sng">
+            <a:prstDash/>
+            <a:headEnd type="none" w="med" len="med"/>
+            <a:tailEnd type="triangle" w="med" len="med"/>
+          </a:ln>
+        </p:spPr>
+        <p:style>
+          <a:lnRef idx="1">
+            <a:schemeClr val="accent1"/>
+          </a:lnRef>
+          <a:fillRef idx="0">
+            <a:schemeClr val="accent1"/>
+          </a:fillRef>
+          <a:effectRef idx="0">
+            <a:schemeClr val="accent1"/>
+          </a:effectRef>
+          <a:fontRef idx="minor">
+            <a:schemeClr val="tx1"/>
+          </a:fontRef>
+        </p:style>
+      </p:cxnSp>
+    </p:spTree>
+  </p:cSld>
+  <p:clrMapOvr>
+    <a:masterClrMapping/>
+  </p:clrMapOvr>
+  <mc:AlternateContent xmlns:mc="http://schemas.openxmlformats.org/markup-compatibility/2006">
+    <mc:Choice xmlns:p14="http://schemas.microsoft.com/office/powerpoint/2010/main" Requires="p14">
+      <p:transition spd="slow" p14:dur="1000"/>
+    </mc:Choice>
+    <mc:Fallback>
+      <p:transition spd="slow"/>
+    </mc:Fallback>
+  </mc:AlternateContent>
+  <p:timing>
+    <p:tnLst>
+      <p:par>
+        <p:cTn id="1" dur="indefinite" restart="never" nodeType="tmRoot"/>
+      </p:par>
+    </p:tnLst>
+  </p:timing>
+</p:sld>
+</file>
+
+<file path=ppt/slides/slide12.xml><?xml version="1.0" encoding="utf-8"?>
+<p:sld xmlns:a="http://schemas.openxmlformats.org/drawingml/2006/main" xmlns:r="http://schemas.openxmlformats.org/officeDocument/2006/relationships" xmlns:p="http://schemas.openxmlformats.org/presentationml/2006/main">
+  <p:cSld>
+    <p:spTree>
+      <p:nvGrpSpPr>
+        <p:cNvPr id="1" name=""/>
+        <p:cNvGrpSpPr/>
+        <p:nvPr/>
+      </p:nvGrpSpPr>
+      <p:grpSpPr>
+        <a:xfrm>
+          <a:off x="0" y="0"/>
+          <a:ext cx="0" cy="0"/>
+          <a:chOff x="0" y="0"/>
+          <a:chExt cx="0" cy="0"/>
+        </a:xfrm>
+      </p:grpSpPr>
+      <p:sp>
+        <p:nvSpPr>
+          <p:cNvPr id="2" name="Rect 0"/>
+          <p:cNvSpPr txBox="1">
+            <a:spLocks/>
+          </p:cNvSpPr>
+          <p:nvPr/>
+        </p:nvSpPr>
+        <p:spPr>
+          <a:xfrm rot="0">
+            <a:off x="4298315" y="362585"/>
+            <a:ext cx="3624580" cy="554990"/>
+          </a:xfrm>
+          <a:prstGeom prst="rect"/>
+          <a:noFill/>
+          <a:ln w="0">
+            <a:noFill/>
+            <a:prstDash/>
+          </a:ln>
+        </p:spPr>
+        <p:txBody>
+          <a:bodyPr wrap="square" lIns="89535" tIns="46355" rIns="89535" bIns="46355" numCol="1" vert="horz" anchor="t">
+            <a:spAutoFit/>
+          </a:bodyPr>
+          <a:lstStyle/>
+          <a:p>
+            <a:pPr marL="0" indent="0" rtl="0" algn="l" defTabSz="914400" eaLnBrk="1" latinLnBrk="0" hangingPunct="1">
+              <a:buFontTx/>
+              <a:buNone/>
+            </a:pPr>
+            <a:r>
+              <a:rPr lang="ko-KR" sz="3000" b="1">
+                <a:solidFill>
+                  <a:schemeClr val="tx1"/>
+                </a:solidFill>
+                <a:latin typeface="맑은 고딕" charset="0"/>
+                <a:ea typeface="맑은 고딕" charset="0"/>
+              </a:rPr>
+              <a:t>열두</a:t>
+            </a:r>
+            <a:r>
+              <a:rPr lang="ko-KR" sz="3000" b="1">
+                <a:solidFill>
+                  <a:schemeClr val="tx1"/>
+                </a:solidFill>
+                <a:latin typeface="맑은 고딕" charset="0"/>
+                <a:ea typeface="맑은 고딕" charset="0"/>
+              </a:rPr>
+              <a:t> 번째 튜토리얼</a:t>
+            </a:r>
+            <a:r>
+              <a:rPr sz="3000" b="1">
+                <a:solidFill>
+                  <a:schemeClr val="tx1"/>
+                </a:solidFill>
+                <a:latin typeface="맑은 고딕" charset="0"/>
+                <a:ea typeface="맑은 고딕" charset="0"/>
+              </a:rPr>
+              <a:t> </a:t>
+            </a:r>
+            <a:endParaRPr lang="ko-KR" altLang="en-US" sz="3000" b="1">
+              <a:solidFill>
+                <a:schemeClr val="tx1"/>
+              </a:solidFill>
+              <a:latin typeface="맑은 고딕" charset="0"/>
+              <a:ea typeface="맑은 고딕" charset="0"/>
+            </a:endParaRPr>
+          </a:p>
+        </p:txBody>
+      </p:sp>
+      <p:sp>
+        <p:nvSpPr>
+          <p:cNvPr id="40" name="Rect 0"/>
+          <p:cNvSpPr txBox="1">
+            <a:spLocks/>
+          </p:cNvSpPr>
+          <p:nvPr/>
+        </p:nvSpPr>
+        <p:spPr>
+          <a:xfrm rot="0">
+            <a:off x="1268095" y="4676775"/>
+            <a:ext cx="4102735" cy="1508125"/>
+          </a:xfrm>
+          <a:prstGeom prst="rect"/>
+          <a:noFill/>
+          <a:ln w="0">
+            <a:noFill/>
+            <a:prstDash/>
+          </a:ln>
+        </p:spPr>
+        <p:txBody>
+          <a:bodyPr wrap="square" lIns="89535" tIns="46355" rIns="89535" bIns="46355" numCol="1" vert="horz" anchor="t">
+            <a:spAutoFit/>
+          </a:bodyPr>
+          <a:lstStyle/>
+          <a:p>
+            <a:pPr marL="0" indent="0" rtl="0" algn="l" defTabSz="914400" eaLnBrk="1" latinLnBrk="0" hangingPunct="1">
+              <a:buFontTx/>
+              <a:buNone/>
+            </a:pPr>
+            <a:r>
+              <a:rPr sz="2000" b="1">
+                <a:solidFill>
+                  <a:srgbClr val="0611F2"/>
+                </a:solidFill>
+                <a:latin typeface="맑은 고딕" charset="0"/>
+                <a:ea typeface="맑은 고딕" charset="0"/>
+              </a:rPr>
+              <a:t>30</a:t>
+            </a:r>
+            <a:r>
+              <a:rPr sz="2000" b="1">
+                <a:solidFill>
+                  <a:srgbClr val="0611F2"/>
+                </a:solidFill>
+                <a:latin typeface="맑은 고딕" charset="0"/>
+                <a:ea typeface="맑은 고딕" charset="0"/>
+              </a:rPr>
+              <a:t>. </a:t>
+            </a:r>
+            <a:r>
+              <a:rPr lang="ko-KR" sz="1800">
+                <a:latin typeface="맑은 고딕" charset="0"/>
+                <a:ea typeface="맑은 고딕" charset="0"/>
+              </a:rPr>
+              <a:t>이제 </a:t>
+            </a:r>
+            <a:r>
+              <a:rPr sz="1800">
+                <a:latin typeface="맑은 고딕" charset="0"/>
+                <a:ea typeface="맑은 고딕" charset="0"/>
+              </a:rPr>
+              <a:t>UI를 선택하고 Slider를 생성합니다.</a:t>
+            </a:r>
+            <a:endParaRPr lang="ko-KR" altLang="en-US" sz="1800">
+              <a:latin typeface="맑은 고딕" charset="0"/>
+              <a:ea typeface="맑은 고딕" charset="0"/>
+            </a:endParaRPr>
+          </a:p>
+          <a:p>
+            <a:pPr marL="0" indent="0" rtl="0" algn="l" defTabSz="914400" eaLnBrk="1" latinLnBrk="0" hangingPunct="1">
+              <a:buFontTx/>
+              <a:buNone/>
+            </a:pPr>
+            <a:endParaRPr lang="ko-KR" altLang="en-US" sz="1800">
+              <a:latin typeface="맑은 고딕" charset="0"/>
+              <a:ea typeface="맑은 고딕" charset="0"/>
+            </a:endParaRPr>
+          </a:p>
+          <a:p>
+            <a:pPr marL="0" indent="0" rtl="0" algn="l" defTabSz="914400" eaLnBrk="1" latinLnBrk="0" hangingPunct="1">
+              <a:buFontTx/>
+              <a:buNone/>
+            </a:pPr>
+            <a:r>
+              <a:rPr lang="ko-KR" sz="1800">
+                <a:latin typeface="맑은 고딕" charset="0"/>
+                <a:ea typeface="맑은 고딕" charset="0"/>
+              </a:rPr>
+              <a:t>그런 다음</a:t>
+            </a:r>
+            <a:r>
+              <a:rPr sz="1800">
+                <a:latin typeface="맑은 고딕" charset="0"/>
+                <a:ea typeface="맑은 고딕" charset="0"/>
+              </a:rPr>
+              <a:t> </a:t>
+            </a:r>
+            <a:r>
+              <a:rPr lang="ko-KR" sz="1800">
+                <a:latin typeface="맑은 고딕" charset="0"/>
+                <a:ea typeface="맑은 고딕" charset="0"/>
+              </a:rPr>
+              <a:t>Health Gauge</a:t>
+            </a:r>
+            <a:r>
+              <a:rPr sz="1800">
+                <a:latin typeface="맑은 고딕" charset="0"/>
+                <a:ea typeface="맑은 고딕" charset="0"/>
+              </a:rPr>
+              <a:t>라는 이름으로 정의합니다.</a:t>
+            </a:r>
+            <a:endParaRPr lang="ko-KR" altLang="en-US" sz="1800">
+              <a:latin typeface="맑은 고딕" charset="0"/>
+              <a:ea typeface="맑은 고딕" charset="0"/>
+            </a:endParaRPr>
+          </a:p>
+        </p:txBody>
+      </p:sp>
+      <p:sp>
+        <p:nvSpPr>
+          <p:cNvPr id="44" name="Rect 0"/>
+          <p:cNvSpPr txBox="1">
+            <a:spLocks/>
+          </p:cNvSpPr>
+          <p:nvPr/>
+        </p:nvSpPr>
+        <p:spPr>
+          <a:xfrm rot="0">
+            <a:off x="6824980" y="2794000"/>
+            <a:ext cx="4290060" cy="861695"/>
+          </a:xfrm>
+          <a:prstGeom prst="rect"/>
+          <a:noFill/>
+        </p:spPr>
+        <p:txBody>
+          <a:bodyPr wrap="square" lIns="0" tIns="0" rIns="0" bIns="0" vert="horz" anchor="t">
+            <a:noAutofit/>
+          </a:bodyPr>
+          <a:lstStyle/>
+          <a:p>
+            <a:pPr marL="0" indent="0" rtl="0" algn="l" defTabSz="914400" eaLnBrk="1" latinLnBrk="0" hangingPunct="1">
+              <a:buFontTx/>
+              <a:buNone/>
+            </a:pPr>
+            <a:r>
+              <a:rPr sz="2000" b="1">
+                <a:solidFill>
+                  <a:srgbClr val="0611F2"/>
+                </a:solidFill>
+                <a:latin typeface="맑은 고딕" charset="0"/>
+                <a:ea typeface="맑은 고딕" charset="0"/>
+              </a:rPr>
+              <a:t>31</a:t>
+            </a:r>
+            <a:r>
+              <a:rPr sz="2000" b="1">
+                <a:solidFill>
+                  <a:srgbClr val="0611F2"/>
+                </a:solidFill>
+                <a:latin typeface="맑은 고딕" charset="0"/>
+                <a:ea typeface="맑은 고딕" charset="0"/>
+              </a:rPr>
+              <a:t>. </a:t>
+            </a:r>
+            <a:r>
+              <a:rPr lang="ko-KR" sz="1800">
+                <a:latin typeface="맑은 고딕" charset="0"/>
+                <a:ea typeface="맑은 고딕" charset="0"/>
+              </a:rPr>
+              <a:t>그다음 State 스크립트에서 Animator 변수를 선언하고 Slider 변수를 선언합니다. </a:t>
+            </a:r>
+            <a:endParaRPr lang="ko-KR" altLang="en-US" sz="1800">
+              <a:latin typeface="맑은 고딕" charset="0"/>
+              <a:ea typeface="맑은 고딕" charset="0"/>
+            </a:endParaRPr>
+          </a:p>
+        </p:txBody>
+      </p:sp>
+      <p:pic>
+        <p:nvPicPr>
+          <p:cNvPr id="46" name="그림 38" descr="C:/Users/Admin1/AppData/Roaming/PolarisOffice/ETemp/11920_6069152/fImage220052215724.png"/>
+          <p:cNvPicPr>
+            <a:picLocks noChangeAspect="1"/>
+          </p:cNvPicPr>
+          <p:nvPr/>
+        </p:nvPicPr>
+        <p:blipFill rotWithShape="1">
+          <a:blip r:embed="rId2" cstate="hqprint">
+            <a:extLst>
+              <a:ext uri="{28A0092B-C50C-407E-A947-70E740481C1C}">
+                <a14:useLocalDpi xmlns:a14="http://schemas.microsoft.com/office/drawing/2010/main"/>
+              </a:ext>
+            </a:extLst>
+          </a:blip>
+          <a:stretch>
+            <a:fillRect/>
+          </a:stretch>
+        </p:blipFill>
+        <p:spPr>
+          <a:xfrm rot="0">
+            <a:off x="1271905" y="1263650"/>
+            <a:ext cx="2619375" cy="3325495"/>
+          </a:xfrm>
+          <a:prstGeom prst="roundRect"/>
+          <a:solidFill>
+            <a:srgbClr val="EDEDED"/>
+          </a:solidFill>
+        </p:spPr>
+      </p:pic>
+      <p:pic>
+        <p:nvPicPr>
+          <p:cNvPr id="47" name="그림 39" descr="C:/Users/Admin1/AppData/Roaming/PolarisOffice/ETemp/11920_6069152/fImage83482221478.png"/>
+          <p:cNvPicPr>
+            <a:picLocks noChangeAspect="1"/>
+          </p:cNvPicPr>
+          <p:nvPr/>
+        </p:nvPicPr>
+        <p:blipFill rotWithShape="1">
+          <a:blip r:embed="rId3" cstate="print">
+            <a:extLst>
+              <a:ext uri="{28A0092B-C50C-407E-A947-70E740481C1C}">
+                <a14:useLocalDpi xmlns:a14="http://schemas.microsoft.com/office/drawing/2010/main" val="0"/>
+              </a:ext>
+            </a:extLst>
+          </a:blip>
+          <a:stretch>
+            <a:fillRect/>
+          </a:stretch>
+        </p:blipFill>
+        <p:spPr>
+          <a:xfrm rot="0">
+            <a:off x="4057015" y="1878330"/>
+            <a:ext cx="1312545" cy="2120900"/>
+          </a:xfrm>
+          <a:prstGeom prst="roundRect"/>
+          <a:solidFill>
+            <a:srgbClr val="EDEDED"/>
+          </a:solidFill>
+        </p:spPr>
+      </p:pic>
+      <p:pic>
+        <p:nvPicPr>
+          <p:cNvPr id="48" name="그림 48" descr="C:/Users/Admin1/AppData/Roaming/PolarisOffice/ETemp/11920_6069152/fImage347542259358.png"/>
+          <p:cNvPicPr>
+            <a:picLocks noChangeAspect="1"/>
+          </p:cNvPicPr>
+          <p:nvPr/>
+        </p:nvPicPr>
+        <p:blipFill rotWithShape="1">
+          <a:blip r:embed="rId4" cstate="print">
+            <a:extLst>
+              <a:ext uri="{28A0092B-C50C-407E-A947-70E740481C1C}">
+                <a14:useLocalDpi xmlns:a14="http://schemas.microsoft.com/office/drawing/2010/main" val="0"/>
+              </a:ext>
+            </a:extLst>
+          </a:blip>
+          <a:stretch>
+            <a:fillRect/>
+          </a:stretch>
+        </p:blipFill>
+        <p:spPr>
+          <a:xfrm rot="0">
+            <a:off x="6824980" y="1259840"/>
+            <a:ext cx="4298315" cy="1434465"/>
+          </a:xfrm>
+          <a:prstGeom prst="roundRect"/>
+          <a:solidFill>
+            <a:srgbClr val="EDEDED"/>
+          </a:solidFill>
+        </p:spPr>
+      </p:pic>
+      <p:sp>
+        <p:nvSpPr>
+          <p:cNvPr id="50" name="텍스트 상자 54"/>
+          <p:cNvSpPr txBox="1">
+            <a:spLocks/>
+          </p:cNvSpPr>
+          <p:nvPr/>
+        </p:nvSpPr>
+        <p:spPr>
+          <a:xfrm rot="0">
+            <a:off x="6830060" y="5326380"/>
+            <a:ext cx="4290060" cy="861695"/>
+          </a:xfrm>
+          <a:prstGeom prst="rect"/>
+          <a:noFill/>
+        </p:spPr>
+        <p:txBody>
+          <a:bodyPr wrap="square" lIns="0" tIns="0" rIns="0" bIns="0" vert="horz" anchor="t">
+            <a:noAutofit/>
+          </a:bodyPr>
+          <a:lstStyle/>
+          <a:p>
+            <a:pPr marL="0" indent="0" rtl="0" algn="l" defTabSz="914400" eaLnBrk="1" latinLnBrk="0" hangingPunct="1">
+              <a:buFontTx/>
+              <a:buNone/>
+            </a:pPr>
+            <a:r>
+              <a:rPr sz="2000" b="1">
+                <a:solidFill>
+                  <a:srgbClr val="0611F2"/>
+                </a:solidFill>
+                <a:latin typeface="맑은 고딕" charset="0"/>
+                <a:ea typeface="맑은 고딕" charset="0"/>
+              </a:rPr>
+              <a:t>3</a:t>
+            </a:r>
+            <a:r>
+              <a:rPr lang="ko-KR" sz="2000" b="1">
+                <a:solidFill>
+                  <a:srgbClr val="0611F2"/>
+                </a:solidFill>
+                <a:latin typeface="맑은 고딕" charset="0"/>
+                <a:ea typeface="맑은 고딕" charset="0"/>
+              </a:rPr>
+              <a:t>2</a:t>
+            </a:r>
+            <a:r>
+              <a:rPr sz="2000" b="1">
+                <a:solidFill>
+                  <a:srgbClr val="0611F2"/>
+                </a:solidFill>
+                <a:latin typeface="맑은 고딕" charset="0"/>
+                <a:ea typeface="맑은 고딕" charset="0"/>
+              </a:rPr>
+              <a:t>. </a:t>
+            </a:r>
+            <a:r>
+              <a:rPr lang="ko-KR" sz="1800">
+                <a:latin typeface="맑은 고딕" charset="0"/>
+                <a:ea typeface="맑은 고딕" charset="0"/>
+              </a:rPr>
+              <a:t>그리고 StateLayer( ) 함수를 선언하고 애니메이션 레이어의 가중치를 설정하도록 선언합니다.</a:t>
+            </a:r>
+            <a:endParaRPr lang="ko-KR" altLang="en-US" sz="1800">
+              <a:latin typeface="맑은 고딕" charset="0"/>
+              <a:ea typeface="맑은 고딕" charset="0"/>
+            </a:endParaRPr>
+          </a:p>
+        </p:txBody>
+      </p:sp>
+      <p:pic>
+        <p:nvPicPr>
+          <p:cNvPr id="51" name="그림 65" descr="C:/Users/Admin1/AppData/Roaming/PolarisOffice/ETemp/11920_6069152/fImage331732406962.png"/>
+          <p:cNvPicPr>
+            <a:picLocks noChangeAspect="1"/>
+          </p:cNvPicPr>
+          <p:nvPr/>
+        </p:nvPicPr>
+        <p:blipFill rotWithShape="1">
+          <a:blip r:embed="rId5" cstate="print">
+            <a:extLst>
+              <a:ext uri="{28A0092B-C50C-407E-A947-70E740481C1C}">
+                <a14:useLocalDpi xmlns:a14="http://schemas.microsoft.com/office/drawing/2010/main" val="0"/>
+              </a:ext>
+            </a:extLst>
+          </a:blip>
+          <a:stretch>
+            <a:fillRect/>
+          </a:stretch>
+        </p:blipFill>
+        <p:spPr>
+          <a:xfrm rot="0">
+            <a:off x="6825615" y="3772535"/>
+            <a:ext cx="4297680" cy="1456690"/>
+          </a:xfrm>
+          <a:prstGeom prst="roundRect"/>
+          <a:solidFill>
+            <a:srgbClr val="EDEDED"/>
+          </a:solidFill>
+        </p:spPr>
+      </p:pic>
+    </p:spTree>
+  </p:cSld>
+  <p:clrMapOvr>
+    <a:masterClrMapping/>
+  </p:clrMapOvr>
+  <mc:AlternateContent xmlns:mc="http://schemas.openxmlformats.org/markup-compatibility/2006">
+    <mc:Choice xmlns:p14="http://schemas.microsoft.com/office/powerpoint/2010/main" Requires="p14">
+      <p:transition spd="slow" p14:dur="1000"/>
+    </mc:Choice>
+    <mc:Fallback>
+      <p:transition spd="slow"/>
+    </mc:Fallback>
+  </mc:AlternateContent>
+  <p:timing>
+    <p:tnLst>
+      <p:par>
+        <p:cTn id="1" dur="indefinite" restart="never" nodeType="tmRoot"/>
+      </p:par>
+    </p:tnLst>
+  </p:timing>
+</p:sld>
+</file>
+
+<file path=ppt/slides/slide13.xml><?xml version="1.0" encoding="utf-8"?>
+<p:sld xmlns:a="http://schemas.openxmlformats.org/drawingml/2006/main" xmlns:r="http://schemas.openxmlformats.org/officeDocument/2006/relationships" xmlns:p="http://schemas.openxmlformats.org/presentationml/2006/main">
+  <p:cSld>
+    <p:spTree>
+      <p:nvGrpSpPr>
+        <p:cNvPr id="1" name=""/>
+        <p:cNvGrpSpPr/>
+        <p:nvPr/>
+      </p:nvGrpSpPr>
+      <p:grpSpPr>
+        <a:xfrm>
+          <a:off x="0" y="0"/>
+          <a:ext cx="0" cy="0"/>
+          <a:chOff x="0" y="0"/>
+          <a:chExt cx="0" cy="0"/>
+        </a:xfrm>
+      </p:grpSpPr>
+      <p:sp>
+        <p:nvSpPr>
+          <p:cNvPr id="2" name="Rect 0"/>
+          <p:cNvSpPr txBox="1">
+            <a:spLocks/>
+          </p:cNvSpPr>
+          <p:nvPr/>
+        </p:nvSpPr>
+        <p:spPr>
+          <a:xfrm rot="0">
+            <a:off x="4298315" y="362585"/>
+            <a:ext cx="3624580" cy="554990"/>
+          </a:xfrm>
+          <a:prstGeom prst="rect"/>
+          <a:noFill/>
+          <a:ln w="0">
+            <a:noFill/>
+            <a:prstDash/>
+          </a:ln>
+        </p:spPr>
+        <p:txBody>
+          <a:bodyPr wrap="square" lIns="89535" tIns="46355" rIns="89535" bIns="46355" numCol="1" vert="horz" anchor="t">
+            <a:spAutoFit/>
+          </a:bodyPr>
+          <a:lstStyle/>
+          <a:p>
+            <a:pPr marL="0" indent="0" rtl="0" algn="l" defTabSz="914400" eaLnBrk="1" latinLnBrk="0" hangingPunct="1">
+              <a:buFontTx/>
+              <a:buNone/>
+            </a:pPr>
+            <a:r>
+              <a:rPr lang="ko-KR" sz="3000" b="1">
+                <a:solidFill>
+                  <a:schemeClr val="tx1"/>
+                </a:solidFill>
+                <a:latin typeface="맑은 고딕" charset="0"/>
+                <a:ea typeface="맑은 고딕" charset="0"/>
+              </a:rPr>
+              <a:t>열세</a:t>
+            </a:r>
+            <a:r>
+              <a:rPr lang="ko-KR" sz="3000" b="1">
+                <a:solidFill>
+                  <a:schemeClr val="tx1"/>
+                </a:solidFill>
+                <a:latin typeface="맑은 고딕" charset="0"/>
+                <a:ea typeface="맑은 고딕" charset="0"/>
+              </a:rPr>
+              <a:t> 번째 튜토리얼</a:t>
+            </a:r>
+            <a:r>
+              <a:rPr sz="3000" b="1">
+                <a:solidFill>
+                  <a:schemeClr val="tx1"/>
+                </a:solidFill>
+                <a:latin typeface="맑은 고딕" charset="0"/>
+                <a:ea typeface="맑은 고딕" charset="0"/>
+              </a:rPr>
+              <a:t> </a:t>
+            </a:r>
+            <a:endParaRPr lang="ko-KR" altLang="en-US" sz="3000" b="1">
+              <a:solidFill>
+                <a:schemeClr val="tx1"/>
+              </a:solidFill>
+              <a:latin typeface="맑은 고딕" charset="0"/>
+              <a:ea typeface="맑은 고딕" charset="0"/>
+            </a:endParaRPr>
+          </a:p>
+        </p:txBody>
+      </p:sp>
+      <p:sp>
+        <p:nvSpPr>
+          <p:cNvPr id="52" name="텍스트 상자 63"/>
+          <p:cNvSpPr txBox="1">
+            <a:spLocks/>
+          </p:cNvSpPr>
+          <p:nvPr/>
+        </p:nvSpPr>
+        <p:spPr>
+          <a:xfrm rot="0">
+            <a:off x="6838315" y="4769485"/>
+            <a:ext cx="4290060" cy="1415415"/>
+          </a:xfrm>
+          <a:prstGeom prst="rect"/>
+          <a:noFill/>
+        </p:spPr>
+        <p:txBody>
+          <a:bodyPr wrap="square" lIns="0" tIns="0" rIns="0" bIns="0" vert="horz" anchor="t">
+            <a:noAutofit/>
+          </a:bodyPr>
+          <a:lstStyle/>
+          <a:p>
+            <a:pPr marL="0" indent="0" rtl="0" algn="l" defTabSz="914400" eaLnBrk="1" latinLnBrk="0" hangingPunct="1">
+              <a:buFontTx/>
+              <a:buNone/>
+            </a:pPr>
+            <a:r>
+              <a:rPr sz="2000" b="1">
+                <a:solidFill>
+                  <a:srgbClr val="0611F2"/>
+                </a:solidFill>
+                <a:latin typeface="맑은 고딕" charset="0"/>
+                <a:ea typeface="맑은 고딕" charset="0"/>
+              </a:rPr>
+              <a:t>3</a:t>
+            </a:r>
+            <a:r>
+              <a:rPr lang="ko-KR" sz="2000" b="1">
+                <a:solidFill>
+                  <a:srgbClr val="0611F2"/>
+                </a:solidFill>
+                <a:latin typeface="맑은 고딕" charset="0"/>
+                <a:ea typeface="맑은 고딕" charset="0"/>
+              </a:rPr>
+              <a:t>5</a:t>
+            </a:r>
+            <a:r>
+              <a:rPr sz="2000" b="1">
+                <a:solidFill>
+                  <a:srgbClr val="0611F2"/>
+                </a:solidFill>
+                <a:latin typeface="맑은 고딕" charset="0"/>
+                <a:ea typeface="맑은 고딕" charset="0"/>
+              </a:rPr>
+              <a:t>. </a:t>
+            </a:r>
+            <a:r>
+              <a:rPr lang="ko-KR" sz="1800">
+                <a:latin typeface="맑은 고딕" charset="0"/>
+                <a:ea typeface="맑은 고딕" charset="0"/>
+              </a:rPr>
+              <a:t>마지막으로 Health Gauge 오브젝트의 앵커와 위치를 설정합니다.</a:t>
+            </a:r>
+            <a:endParaRPr lang="ko-KR" altLang="en-US" sz="1800">
+              <a:latin typeface="맑은 고딕" charset="0"/>
+              <a:ea typeface="맑은 고딕" charset="0"/>
+            </a:endParaRPr>
+          </a:p>
+          <a:p>
+            <a:pPr marL="0" indent="0" rtl="0" algn="l" defTabSz="914400" eaLnBrk="1" latinLnBrk="0" hangingPunct="1">
+              <a:buFontTx/>
+              <a:buNone/>
+            </a:pPr>
+            <a:endParaRPr lang="ko-KR" altLang="en-US" sz="1800">
+              <a:latin typeface="맑은 고딕" charset="0"/>
+              <a:ea typeface="맑은 고딕" charset="0"/>
+            </a:endParaRPr>
+          </a:p>
+          <a:p>
+            <a:pPr marL="0" indent="0" rtl="0" algn="l" defTabSz="914400" eaLnBrk="1" latinLnBrk="0" hangingPunct="1">
+              <a:buFontTx/>
+              <a:buNone/>
+            </a:pPr>
+            <a:r>
+              <a:rPr lang="ko-KR" sz="1800">
+                <a:latin typeface="맑은 고딕" charset="0"/>
+                <a:ea typeface="맑은 고딕" charset="0"/>
+              </a:rPr>
+              <a:t>그런 다음 Health Gauge 오브젝트의 크기와 회전 값을 설정합니다.</a:t>
+            </a:r>
+            <a:endParaRPr lang="ko-KR" altLang="en-US" sz="1800">
+              <a:latin typeface="맑은 고딕" charset="0"/>
+              <a:ea typeface="맑은 고딕" charset="0"/>
+            </a:endParaRPr>
+          </a:p>
+        </p:txBody>
+      </p:sp>
+      <p:pic>
+        <p:nvPicPr>
+          <p:cNvPr id="55" name="그림 69" descr="C:/Users/Admin1/AppData/Roaming/PolarisOffice/ETemp/11920_6069152/fImage83482424464.png"/>
+          <p:cNvPicPr>
+            <a:picLocks noChangeAspect="1"/>
+          </p:cNvPicPr>
+          <p:nvPr/>
+        </p:nvPicPr>
+        <p:blipFill rotWithShape="1">
+          <a:blip r:embed="rId2" cstate="print">
+            <a:extLst>
+              <a:ext uri="{28A0092B-C50C-407E-A947-70E740481C1C}">
+                <a14:useLocalDpi xmlns:a14="http://schemas.microsoft.com/office/drawing/2010/main" val="0"/>
+              </a:ext>
+            </a:extLst>
+          </a:blip>
+          <a:stretch>
+            <a:fillRect/>
+          </a:stretch>
+        </p:blipFill>
+        <p:spPr>
+          <a:xfrm rot="0">
+            <a:off x="1247140" y="1263015"/>
+            <a:ext cx="1247775" cy="1625600"/>
+          </a:xfrm>
+          <a:prstGeom prst="roundRect"/>
+          <a:solidFill>
+            <a:srgbClr val="EDEDED"/>
+          </a:solidFill>
+        </p:spPr>
+      </p:pic>
+      <p:pic>
+        <p:nvPicPr>
+          <p:cNvPr id="56" name="그림 70" descr="C:/Users/Admin1/AppData/Roaming/PolarisOffice/ETemp/11920_6069152/fImage251962435705.png"/>
+          <p:cNvPicPr>
+            <a:picLocks noChangeAspect="1"/>
+          </p:cNvPicPr>
+          <p:nvPr/>
+        </p:nvPicPr>
+        <p:blipFill rotWithShape="1">
+          <a:blip r:embed="rId3" cstate="print">
+            <a:extLst>
+              <a:ext uri="{28A0092B-C50C-407E-A947-70E740481C1C}">
+                <a14:useLocalDpi xmlns:a14="http://schemas.microsoft.com/office/drawing/2010/main" val="0"/>
+              </a:ext>
+            </a:extLst>
+          </a:blip>
+          <a:stretch>
+            <a:fillRect/>
+          </a:stretch>
+        </p:blipFill>
+        <p:spPr>
+          <a:xfrm rot="0">
+            <a:off x="2568575" y="1263650"/>
+            <a:ext cx="2794000" cy="1638300"/>
+          </a:xfrm>
+          <a:prstGeom prst="roundRect"/>
+          <a:solidFill>
+            <a:srgbClr val="EDEDED"/>
+          </a:solidFill>
+        </p:spPr>
+      </p:pic>
+      <p:sp>
+        <p:nvSpPr>
+          <p:cNvPr id="57" name="텍스트 상자 73"/>
+          <p:cNvSpPr txBox="1">
+            <a:spLocks/>
+          </p:cNvSpPr>
+          <p:nvPr/>
+        </p:nvSpPr>
+        <p:spPr>
+          <a:xfrm rot="0">
+            <a:off x="1243965" y="3032125"/>
+            <a:ext cx="4118610" cy="861695"/>
+          </a:xfrm>
+          <a:prstGeom prst="rect"/>
+          <a:noFill/>
+        </p:spPr>
+        <p:txBody>
+          <a:bodyPr wrap="square" lIns="0" tIns="0" rIns="0" bIns="0" vert="horz" anchor="t">
+            <a:noAutofit/>
+          </a:bodyPr>
+          <a:lstStyle/>
+          <a:p>
+            <a:pPr marL="0" indent="0" rtl="0" algn="l" defTabSz="914400" eaLnBrk="1" latinLnBrk="0" hangingPunct="1">
+              <a:buFontTx/>
+              <a:buNone/>
+            </a:pPr>
+            <a:r>
+              <a:rPr sz="2000" b="1">
+                <a:solidFill>
+                  <a:srgbClr val="0611F2"/>
+                </a:solidFill>
+                <a:latin typeface="맑은 고딕" charset="0"/>
+                <a:ea typeface="맑은 고딕" charset="0"/>
+              </a:rPr>
+              <a:t>3</a:t>
+            </a:r>
+            <a:r>
+              <a:rPr lang="ko-KR" sz="2000" b="1">
+                <a:solidFill>
+                  <a:srgbClr val="0611F2"/>
+                </a:solidFill>
+                <a:latin typeface="맑은 고딕" charset="0"/>
+                <a:ea typeface="맑은 고딕" charset="0"/>
+              </a:rPr>
+              <a:t>3</a:t>
+            </a:r>
+            <a:r>
+              <a:rPr sz="2000" b="1">
+                <a:solidFill>
+                  <a:srgbClr val="0611F2"/>
+                </a:solidFill>
+                <a:latin typeface="맑은 고딕" charset="0"/>
+                <a:ea typeface="맑은 고딕" charset="0"/>
+              </a:rPr>
+              <a:t>. </a:t>
+            </a:r>
+            <a:r>
+              <a:rPr lang="ko-KR" sz="1800">
+                <a:latin typeface="맑은 고딕" charset="0"/>
+                <a:ea typeface="맑은 고딕" charset="0"/>
+              </a:rPr>
+              <a:t>이제 Erika Archer 오브젝트에 있는 State 스크립트에 Health Gauge 오브젝트를 넣어줍니다.</a:t>
+            </a:r>
+            <a:endParaRPr lang="ko-KR" altLang="en-US" sz="1800">
+              <a:latin typeface="맑은 고딕" charset="0"/>
+              <a:ea typeface="맑은 고딕" charset="0"/>
+            </a:endParaRPr>
+          </a:p>
+        </p:txBody>
+      </p:sp>
+      <p:cxnSp>
+        <p:nvCxnSpPr>
+          <p:cNvPr id="58" name="도형 74"/>
+          <p:cNvCxnSpPr/>
+          <p:nvPr/>
+        </p:nvCxnSpPr>
+        <p:spPr>
+          <a:xfrm rot="0">
+            <a:off x="2153285" y="2501900"/>
+            <a:ext cx="3134360" cy="300355"/>
+          </a:xfrm>
+          <a:prstGeom prst="straightConnector1"/>
+          <a:ln w="6350" cap="flat" cmpd="sng">
+            <a:prstDash/>
+            <a:headEnd type="none" w="med" len="med"/>
+            <a:tailEnd type="triangle" w="med" len="med"/>
+          </a:ln>
+        </p:spPr>
+        <p:style>
+          <a:lnRef idx="1">
+            <a:schemeClr val="accent1"/>
+          </a:lnRef>
+          <a:fillRef idx="0">
+            <a:schemeClr val="accent1"/>
+          </a:fillRef>
+          <a:effectRef idx="0">
+            <a:schemeClr val="accent1"/>
+          </a:effectRef>
+          <a:fontRef idx="minor">
+            <a:schemeClr val="tx1"/>
+          </a:fontRef>
+        </p:style>
+      </p:cxnSp>
+      <p:sp>
+        <p:nvSpPr>
+          <p:cNvPr id="60" name="텍스트 상자 76"/>
+          <p:cNvSpPr txBox="1">
+            <a:spLocks/>
+          </p:cNvSpPr>
+          <p:nvPr/>
+        </p:nvSpPr>
+        <p:spPr>
+          <a:xfrm rot="0">
+            <a:off x="1249045" y="5320665"/>
+            <a:ext cx="4104640" cy="861695"/>
+          </a:xfrm>
+          <a:prstGeom prst="rect"/>
+          <a:noFill/>
+        </p:spPr>
+        <p:txBody>
+          <a:bodyPr wrap="square" lIns="0" tIns="0" rIns="0" bIns="0" vert="horz" anchor="t">
+            <a:noAutofit/>
+          </a:bodyPr>
+          <a:lstStyle/>
+          <a:p>
+            <a:pPr marL="0" indent="0" rtl="0" algn="l" defTabSz="914400" eaLnBrk="1" latinLnBrk="0" hangingPunct="1">
+              <a:buFontTx/>
+              <a:buNone/>
+            </a:pPr>
+            <a:r>
+              <a:rPr sz="2000" b="1">
+                <a:solidFill>
+                  <a:srgbClr val="0611F2"/>
+                </a:solidFill>
+                <a:latin typeface="맑은 고딕" charset="0"/>
+                <a:ea typeface="맑은 고딕" charset="0"/>
+              </a:rPr>
+              <a:t>3</a:t>
+            </a:r>
+            <a:r>
+              <a:rPr lang="ko-KR" sz="2000" b="1">
+                <a:solidFill>
+                  <a:srgbClr val="0611F2"/>
+                </a:solidFill>
+                <a:latin typeface="맑은 고딕" charset="0"/>
+                <a:ea typeface="맑은 고딕" charset="0"/>
+              </a:rPr>
+              <a:t>4</a:t>
+            </a:r>
+            <a:r>
+              <a:rPr sz="2000" b="1">
+                <a:solidFill>
+                  <a:srgbClr val="0611F2"/>
+                </a:solidFill>
+                <a:latin typeface="맑은 고딕" charset="0"/>
+                <a:ea typeface="맑은 고딕" charset="0"/>
+              </a:rPr>
+              <a:t>. </a:t>
+            </a:r>
+            <a:r>
+              <a:rPr lang="ko-KR" sz="1800">
+                <a:latin typeface="맑은 고딕" charset="0"/>
+                <a:ea typeface="맑은 고딕" charset="0"/>
+              </a:rPr>
+              <a:t>그리고 Health Gauge 오브젝트의 On Value Changed에 Erika Archer 오브젝트를 넣어줍니다.</a:t>
+            </a:r>
+            <a:endParaRPr lang="ko-KR" altLang="en-US" sz="1800">
+              <a:latin typeface="맑은 고딕" charset="0"/>
+              <a:ea typeface="맑은 고딕" charset="0"/>
+            </a:endParaRPr>
+          </a:p>
+        </p:txBody>
+      </p:sp>
+      <p:pic>
+        <p:nvPicPr>
+          <p:cNvPr id="62" name="그림 78" descr="C:/Users/Admin1/AppData/Roaming/PolarisOffice/ETemp/11920_6069152/fImage181662498145.png"/>
+          <p:cNvPicPr>
+            <a:picLocks noChangeAspect="1"/>
+          </p:cNvPicPr>
+          <p:nvPr/>
+        </p:nvPicPr>
+        <p:blipFill rotWithShape="1">
+          <a:blip r:embed="rId4" cstate="print">
+            <a:extLst>
+              <a:ext uri="{28A0092B-C50C-407E-A947-70E740481C1C}">
+                <a14:useLocalDpi xmlns:a14="http://schemas.microsoft.com/office/drawing/2010/main" val="0"/>
+              </a:ext>
+            </a:extLst>
+          </a:blip>
+          <a:stretch>
+            <a:fillRect/>
+          </a:stretch>
+        </p:blipFill>
+        <p:spPr>
+          <a:xfrm rot="0">
+            <a:off x="6841490" y="1257300"/>
+            <a:ext cx="4290060" cy="3406775"/>
+          </a:xfrm>
+          <a:prstGeom prst="roundRect"/>
+          <a:solidFill>
+            <a:srgbClr val="EDEDED"/>
+          </a:solidFill>
+        </p:spPr>
+      </p:pic>
+      <p:pic>
+        <p:nvPicPr>
+          <p:cNvPr id="63" name="그림 82" descr="C:/Users/Admin1/AppData/Roaming/PolarisOffice/ETemp/11920_6069152/fImage72582513281.png"/>
+          <p:cNvPicPr>
+            <a:picLocks noChangeAspect="1"/>
+          </p:cNvPicPr>
+          <p:nvPr/>
+        </p:nvPicPr>
+        <p:blipFill rotWithShape="1">
+          <a:blip r:embed="rId5" cstate="print">
+            <a:extLst>
+              <a:ext uri="{28A0092B-C50C-407E-A947-70E740481C1C}">
+                <a14:useLocalDpi xmlns:a14="http://schemas.microsoft.com/office/drawing/2010/main" val="0"/>
+              </a:ext>
+            </a:extLst>
+          </a:blip>
+          <a:stretch>
+            <a:fillRect/>
+          </a:stretch>
+        </p:blipFill>
+        <p:spPr>
+          <a:xfrm rot="0">
+            <a:off x="1245870" y="4027170"/>
+            <a:ext cx="1097915" cy="1212215"/>
+          </a:xfrm>
+          <a:prstGeom prst="roundRect"/>
+          <a:solidFill>
+            <a:srgbClr val="EDEDED"/>
+          </a:solidFill>
+        </p:spPr>
+      </p:pic>
+      <p:pic>
+        <p:nvPicPr>
+          <p:cNvPr id="64" name="그림 85" descr="C:/Users/Admin1/AppData/Roaming/PolarisOffice/ETemp/11920_6069152/fImage71112526827.png"/>
+          <p:cNvPicPr>
+            <a:picLocks noChangeAspect="1"/>
+          </p:cNvPicPr>
+          <p:nvPr/>
+        </p:nvPicPr>
+        <p:blipFill rotWithShape="1">
+          <a:blip r:embed="rId6" cstate="print">
+            <a:extLst>
+              <a:ext uri="{28A0092B-C50C-407E-A947-70E740481C1C}">
+                <a14:useLocalDpi xmlns:a14="http://schemas.microsoft.com/office/drawing/2010/main" val="0"/>
+              </a:ext>
+            </a:extLst>
+          </a:blip>
+          <a:stretch>
+            <a:fillRect/>
+          </a:stretch>
+        </p:blipFill>
+        <p:spPr>
+          <a:xfrm rot="0">
+            <a:off x="2457450" y="4019550"/>
+            <a:ext cx="2915285" cy="1219835"/>
+          </a:xfrm>
+          <a:prstGeom prst="roundRect"/>
+          <a:solidFill>
+            <a:srgbClr val="EDEDED"/>
+          </a:solidFill>
+        </p:spPr>
+      </p:pic>
+      <p:cxnSp>
+        <p:nvCxnSpPr>
+          <p:cNvPr id="65" name="도형 88"/>
+          <p:cNvCxnSpPr/>
+          <p:nvPr/>
+        </p:nvCxnSpPr>
+        <p:spPr>
+          <a:xfrm rot="0">
+            <a:off x="1948815" y="4697095"/>
+            <a:ext cx="1356360" cy="51435"/>
+          </a:xfrm>
+          <a:prstGeom prst="straightConnector1"/>
+          <a:ln w="6350" cap="flat" cmpd="sng">
+            <a:prstDash/>
+            <a:headEnd type="none" w="med" len="med"/>
+            <a:tailEnd type="triangle" w="med" len="med"/>
+          </a:ln>
+        </p:spPr>
+        <p:style>
+          <a:lnRef idx="1">
+            <a:schemeClr val="accent1"/>
+          </a:lnRef>
+          <a:fillRef idx="0">
+            <a:schemeClr val="accent1"/>
+          </a:fillRef>
+          <a:effectRef idx="0">
+            <a:schemeClr val="accent1"/>
+          </a:effectRef>
+          <a:fontRef idx="minor">
+            <a:schemeClr val="tx1"/>
+          </a:fontRef>
+        </p:style>
+      </p:cxnSp>
+    </p:spTree>
+  </p:cSld>
+  <p:clrMapOvr>
+    <a:masterClrMapping/>
+  </p:clrMapOvr>
+  <mc:AlternateContent xmlns:mc="http://schemas.openxmlformats.org/markup-compatibility/2006">
+    <mc:Choice xmlns:p14="http://schemas.microsoft.com/office/powerpoint/2010/main" Requires="p14">
+      <p:transition spd="slow" p14:dur="1000"/>
+    </mc:Choice>
+    <mc:Fallback>
+      <p:transition spd="slow"/>
+    </mc:Fallback>
+  </mc:AlternateContent>
+  <p:timing>
+    <p:tnLst>
+      <p:par>
+        <p:cTn id="1" dur="indefinite" restart="never" nodeType="tmRoot"/>
+      </p:par>
+    </p:tnLst>
+  </p:timing>
+</p:sld>
+</file>
+
 <file path=ppt/slides/slide2.xml><?xml version="1.0" encoding="utf-8"?>
 <p:sld xmlns:a="http://schemas.openxmlformats.org/drawingml/2006/main" xmlns:r="http://schemas.openxmlformats.org/officeDocument/2006/relationships" xmlns:p="http://schemas.openxmlformats.org/presentationml/2006/main" xmlns:p14="http://schemas.microsoft.com/office/powerpoint/2010/main">
   <p:cSld>
@@ -6496,7 +8408,7 @@
       </p:sp>
       <p:pic>
         <p:nvPicPr>
-          <p:cNvPr id="5" name="그림 3" descr="C:/Users/Admin1/AppData/Roaming/PolarisOffice/ETemp/5024_9141648/fImage127585341.png"/>
+          <p:cNvPr id="5" name="그림 3"/>
           <p:cNvPicPr>
             <a:picLocks noChangeAspect="1"/>
           </p:cNvPicPr>
@@ -6591,7 +8503,7 @@
       </p:sp>
       <p:pic>
         <p:nvPicPr>
-          <p:cNvPr id="7" name="그림 5" descr="C:/Users/Admin1/AppData/Roaming/PolarisOffice/ETemp/5024_9141648/fImage5713558467.png"/>
+          <p:cNvPr id="7" name="그림 5"/>
           <p:cNvPicPr>
             <a:picLocks noChangeAspect="1"/>
           </p:cNvPicPr>
@@ -6622,7 +8534,7 @@
       </p:pic>
       <p:pic>
         <p:nvPicPr>
-          <p:cNvPr id="8" name="그림 6" descr="C:/Users/Admin1/AppData/Roaming/PolarisOffice/ETemp/5024_9141648/fImage5577566334.png"/>
+          <p:cNvPr id="8" name="그림 6"/>
           <p:cNvPicPr>
             <a:picLocks noChangeAspect="1"/>
           </p:cNvPicPr>
@@ -6717,7 +8629,7 @@
       </p:sp>
       <p:pic>
         <p:nvPicPr>
-          <p:cNvPr id="10" name="그림 15" descr="C:/Users/Admin1/AppData/Roaming/PolarisOffice/ETemp/5024_9141648/fImage4428616500.png"/>
+          <p:cNvPr id="10" name="그림 15"/>
           <p:cNvPicPr>
             <a:picLocks noChangeAspect="1"/>
           </p:cNvPicPr>
@@ -6748,7 +8660,7 @@
       </p:pic>
       <p:pic>
         <p:nvPicPr>
-          <p:cNvPr id="12" name="그림 20" descr="C:/Users/Admin1/AppData/Roaming/PolarisOffice/ETemp/5024_9141648/fImage19421479169.png"/>
+          <p:cNvPr id="12" name="그림 20"/>
           <p:cNvPicPr>
             <a:picLocks noChangeAspect="1"/>
           </p:cNvPicPr>
@@ -6877,7 +8789,7 @@
       </p:sp>
       <p:pic>
         <p:nvPicPr>
-          <p:cNvPr id="15" name="그림 26" descr="C:/Users/Admin1/AppData/Roaming/PolarisOffice/ETemp/5024_9141648/fImage55771525724.png"/>
+          <p:cNvPr id="15" name="그림 26"/>
           <p:cNvPicPr>
             <a:picLocks noChangeAspect="1"/>
           </p:cNvPicPr>
@@ -6965,7 +8877,7 @@
 </file>
 
 <file path=ppt/slides/slide5.xml><?xml version="1.0" encoding="utf-8"?>
-<p:sld xmlns:a="http://schemas.openxmlformats.org/drawingml/2006/main" xmlns:r="http://schemas.openxmlformats.org/officeDocument/2006/relationships" xmlns:p="http://schemas.openxmlformats.org/presentationml/2006/main">
+<p:sld xmlns:a="http://schemas.openxmlformats.org/drawingml/2006/main" xmlns:r="http://schemas.openxmlformats.org/officeDocument/2006/relationships" xmlns:p="http://schemas.openxmlformats.org/presentationml/2006/main" xmlns:p14="http://schemas.microsoft.com/office/powerpoint/2010/main">
   <p:cSld>
     <p:spTree>
       <p:nvGrpSpPr>
@@ -7127,7 +9039,7 @@
       </p:sp>
       <p:pic>
         <p:nvPicPr>
-          <p:cNvPr id="12" name="그림 17" descr="C:/Users/Admin1/AppData/Roaming/PolarisOffice/ETemp/5024_9141648/fImage415711431478.png"/>
+          <p:cNvPr id="12" name="그림 17"/>
           <p:cNvPicPr>
             <a:picLocks noChangeAspect="1"/>
           </p:cNvPicPr>
@@ -7158,7 +9070,948 @@
       </p:pic>
       <p:pic>
         <p:nvPicPr>
-          <p:cNvPr id="13" name="그림 28" descr="C:/Users/Admin1/AppData/Roaming/PolarisOffice/ETemp/5024_9141648/fImage41091549358.png"/>
+          <p:cNvPr id="13" name="그림 28"/>
+          <p:cNvPicPr>
+            <a:picLocks noChangeAspect="1"/>
+          </p:cNvPicPr>
+          <p:nvPr/>
+        </p:nvPicPr>
+        <p:blipFill rotWithShape="1">
+          <a:blip r:embed="rId3" cstate="hqprint">
+            <a:extLst>
+              <a:ext uri="{28A0092B-C50C-407E-A947-70E740481C1C}">
+                <a14:useLocalDpi xmlns:a14="http://schemas.microsoft.com/office/drawing/2010/main"/>
+              </a:ext>
+            </a:extLst>
+          </a:blip>
+          <a:stretch>
+            <a:fillRect/>
+          </a:stretch>
+        </p:blipFill>
+        <p:spPr>
+          <a:xfrm rot="0">
+            <a:off x="8204835" y="1288415"/>
+            <a:ext cx="2827655" cy="1189355"/>
+          </a:xfrm>
+          <a:prstGeom prst="roundRect"/>
+          <a:solidFill>
+            <a:srgbClr val="EDEDED"/>
+          </a:solidFill>
+        </p:spPr>
+      </p:pic>
+      <p:pic>
+        <p:nvPicPr>
+          <p:cNvPr id="14" name="그림 31"/>
+          <p:cNvPicPr>
+            <a:picLocks noChangeAspect="1"/>
+          </p:cNvPicPr>
+          <p:nvPr/>
+        </p:nvPicPr>
+        <p:blipFill rotWithShape="1">
+          <a:blip r:embed="rId4" cstate="hqprint">
+            <a:extLst>
+              <a:ext uri="{28A0092B-C50C-407E-A947-70E740481C1C}">
+                <a14:useLocalDpi xmlns:a14="http://schemas.microsoft.com/office/drawing/2010/main"/>
+              </a:ext>
+            </a:extLst>
+          </a:blip>
+          <a:stretch>
+            <a:fillRect/>
+          </a:stretch>
+        </p:blipFill>
+        <p:spPr>
+          <a:xfrm rot="0">
+            <a:off x="6849745" y="1295400"/>
+            <a:ext cx="1189990" cy="1170305"/>
+          </a:xfrm>
+          <a:prstGeom prst="roundRect"/>
+          <a:solidFill>
+            <a:srgbClr val="EDEDED"/>
+          </a:solidFill>
+        </p:spPr>
+      </p:pic>
+      <p:pic>
+        <p:nvPicPr>
+          <p:cNvPr id="15" name="그림 33"/>
+          <p:cNvPicPr>
+            <a:picLocks noChangeAspect="1"/>
+          </p:cNvPicPr>
+          <p:nvPr/>
+        </p:nvPicPr>
+        <p:blipFill rotWithShape="1">
+          <a:blip r:embed="rId5" cstate="hqprint">
+            <a:extLst>
+              <a:ext uri="{28A0092B-C50C-407E-A947-70E740481C1C}">
+                <a14:useLocalDpi xmlns:a14="http://schemas.microsoft.com/office/drawing/2010/main"/>
+              </a:ext>
+            </a:extLst>
+          </a:blip>
+          <a:stretch>
+            <a:fillRect/>
+          </a:stretch>
+        </p:blipFill>
+        <p:spPr>
+          <a:xfrm rot="10800000">
+            <a:off x="7781290" y="1786890"/>
+            <a:ext cx="625475" cy="351790"/>
+          </a:xfrm>
+          <a:prstGeom prst="rect"/>
+          <a:noFill/>
+        </p:spPr>
+      </p:pic>
+      <p:sp>
+        <p:nvSpPr>
+          <p:cNvPr id="16" name="텍스트 상자 34"/>
+          <p:cNvSpPr txBox="1">
+            <a:spLocks/>
+          </p:cNvSpPr>
+          <p:nvPr/>
+        </p:nvSpPr>
+        <p:spPr>
+          <a:xfrm rot="0">
+            <a:off x="6852285" y="2576830"/>
+            <a:ext cx="4180205" cy="862965"/>
+          </a:xfrm>
+          <a:prstGeom prst="rect"/>
+          <a:noFill/>
+        </p:spPr>
+        <p:txBody>
+          <a:bodyPr wrap="square" lIns="0" tIns="0" rIns="0" bIns="0" numCol="1" vert="horz" anchor="t">
+            <a:noAutofit/>
+          </a:bodyPr>
+          <a:lstStyle/>
+          <a:p>
+            <a:pPr marL="0" indent="0" rtl="0" algn="l" defTabSz="914400" eaLnBrk="1" latinLnBrk="0" hangingPunct="1">
+              <a:buFontTx/>
+              <a:buNone/>
+            </a:pPr>
+            <a:r>
+              <a:rPr sz="2000" b="1">
+                <a:solidFill>
+                  <a:srgbClr val="0611F2"/>
+                </a:solidFill>
+                <a:latin typeface="맑은 고딕" charset="0"/>
+                <a:ea typeface="맑은 고딕" charset="0"/>
+              </a:rPr>
+              <a:t>13. </a:t>
+            </a:r>
+            <a:r>
+              <a:rPr sz="1800">
+                <a:latin typeface="맑은 고딕" charset="0"/>
+                <a:ea typeface="맑은 고딕" charset="0"/>
+              </a:rPr>
+              <a:t>그다음으</a:t>
+            </a:r>
+            <a:r>
+              <a:rPr lang="ko-KR" sz="1800">
+                <a:latin typeface="맑은 고딕" charset="0"/>
+                <a:ea typeface="맑은 고딕" charset="0"/>
+              </a:rPr>
+              <a:t>로</a:t>
+            </a:r>
+            <a:r>
+              <a:rPr sz="1800">
+                <a:latin typeface="맑은 고딕" charset="0"/>
+                <a:ea typeface="맑은 고딕" charset="0"/>
+              </a:rPr>
+              <a:t> erika_a</a:t>
+            </a:r>
+            <a:r>
+              <a:rPr lang="ko-KR" sz="1800">
+                <a:latin typeface="맑은 고딕" charset="0"/>
+                <a:ea typeface="맑은 고딕" charset="0"/>
+              </a:rPr>
+              <a:t>rcher</a:t>
+            </a:r>
+            <a:r>
+              <a:rPr sz="1800">
+                <a:latin typeface="맑은 고딕" charset="0"/>
+                <a:ea typeface="맑은 고딕" charset="0"/>
+              </a:rPr>
+              <a:t> 오브젝트에 방금 생성한 Layer Animator Controller를 넣어줍니다.</a:t>
+            </a:r>
+            <a:endParaRPr lang="ko-KR" altLang="en-US" sz="1800">
+              <a:latin typeface="맑은 고딕" charset="0"/>
+              <a:ea typeface="맑은 고딕" charset="0"/>
+            </a:endParaRPr>
+          </a:p>
+        </p:txBody>
+      </p:sp>
+      <p:pic>
+        <p:nvPicPr>
+          <p:cNvPr id="17" name="그림 1"/>
+          <p:cNvPicPr>
+            <a:picLocks noChangeAspect="1"/>
+          </p:cNvPicPr>
+          <p:nvPr/>
+        </p:nvPicPr>
+        <p:blipFill rotWithShape="1">
+          <a:blip r:embed="rId6" cstate="hqprint">
+            <a:extLst>
+              <a:ext uri="{28A0092B-C50C-407E-A947-70E740481C1C}">
+                <a14:useLocalDpi xmlns:a14="http://schemas.microsoft.com/office/drawing/2010/main"/>
+              </a:ext>
+            </a:extLst>
+          </a:blip>
+          <a:stretch>
+            <a:fillRect/>
+          </a:stretch>
+        </p:blipFill>
+        <p:spPr>
+          <a:xfrm rot="0">
+            <a:off x="6829425" y="3566160"/>
+            <a:ext cx="4186555" cy="1580515"/>
+          </a:xfrm>
+          <a:prstGeom prst="roundRect"/>
+          <a:solidFill>
+            <a:srgbClr val="EDEDED"/>
+          </a:solidFill>
+        </p:spPr>
+      </p:pic>
+      <p:sp>
+        <p:nvSpPr>
+          <p:cNvPr id="18" name="텍스트 상자 4"/>
+          <p:cNvSpPr txBox="1">
+            <a:spLocks/>
+          </p:cNvSpPr>
+          <p:nvPr/>
+        </p:nvSpPr>
+        <p:spPr>
+          <a:xfrm rot="0">
+            <a:off x="6849110" y="5283835"/>
+            <a:ext cx="4174490" cy="901700"/>
+          </a:xfrm>
+          <a:prstGeom prst="rect"/>
+          <a:noFill/>
+        </p:spPr>
+        <p:txBody>
+          <a:bodyPr wrap="square" lIns="0" tIns="0" rIns="0" bIns="0" numCol="1" vert="horz" anchor="t">
+            <a:noAutofit/>
+          </a:bodyPr>
+          <a:lstStyle/>
+          <a:p>
+            <a:pPr marL="0" indent="0" rtl="0" algn="l" defTabSz="914400" eaLnBrk="1" latinLnBrk="0" hangingPunct="1">
+              <a:buFontTx/>
+              <a:buNone/>
+            </a:pPr>
+            <a:r>
+              <a:rPr sz="2000" b="1">
+                <a:solidFill>
+                  <a:srgbClr val="0611F2"/>
+                </a:solidFill>
+                <a:latin typeface="맑은 고딕" charset="0"/>
+                <a:ea typeface="맑은 고딕" charset="0"/>
+              </a:rPr>
+              <a:t>1</a:t>
+            </a:r>
+            <a:r>
+              <a:rPr sz="2000" b="1">
+                <a:solidFill>
+                  <a:srgbClr val="0611F2"/>
+                </a:solidFill>
+                <a:latin typeface="맑은 고딕" charset="0"/>
+                <a:ea typeface="맑은 고딕" charset="0"/>
+              </a:rPr>
+              <a:t>4</a:t>
+            </a:r>
+            <a:r>
+              <a:rPr sz="2000" b="1">
+                <a:solidFill>
+                  <a:srgbClr val="0611F2"/>
+                </a:solidFill>
+                <a:latin typeface="맑은 고딕" charset="0"/>
+                <a:ea typeface="맑은 고딕" charset="0"/>
+              </a:rPr>
+              <a:t>. </a:t>
+            </a:r>
+            <a:r>
+              <a:rPr sz="1800">
+                <a:latin typeface="맑은 고딕" charset="0"/>
+                <a:ea typeface="맑은 고딕" charset="0"/>
+              </a:rPr>
+              <a:t>이제</a:t>
+            </a:r>
+            <a:r>
+              <a:rPr sz="1800">
+                <a:latin typeface="맑은 고딕" charset="0"/>
+                <a:ea typeface="맑은 고딕" charset="0"/>
+              </a:rPr>
+              <a:t> L</a:t>
+            </a:r>
+            <a:r>
+              <a:rPr lang="ko-KR" sz="1800">
+                <a:latin typeface="맑은 고딕" charset="0"/>
+                <a:ea typeface="맑은 고딕" charset="0"/>
+              </a:rPr>
+              <a:t>ayer Animation Controller에서 Layer를 추가하고 Other Layer라는 이름으로 정의합니다.</a:t>
+            </a:r>
+            <a:endParaRPr lang="ko-KR" altLang="en-US" sz="1800">
+              <a:latin typeface="맑은 고딕" charset="0"/>
+              <a:ea typeface="맑은 고딕" charset="0"/>
+            </a:endParaRPr>
+          </a:p>
+        </p:txBody>
+      </p:sp>
+    </p:spTree>
+  </p:cSld>
+  <p:clrMapOvr>
+    <a:masterClrMapping/>
+  </p:clrMapOvr>
+  <mc:AlternateContent xmlns:mc="http://schemas.openxmlformats.org/markup-compatibility/2006">
+    <mc:Choice xmlns:p14="http://schemas.microsoft.com/office/powerpoint/2010/main" Requires="p14">
+      <p:transition spd="slow" p14:dur="1000"/>
+    </mc:Choice>
+    <mc:Fallback>
+      <p:transition spd="slow"/>
+    </mc:Fallback>
+  </mc:AlternateContent>
+  <p:timing>
+    <p:tnLst>
+      <p:par>
+        <p:cTn id="1" dur="indefinite" restart="never" nodeType="tmRoot"/>
+      </p:par>
+    </p:tnLst>
+  </p:timing>
+</p:sld>
+</file>
+
+<file path=ppt/slides/slide6.xml><?xml version="1.0" encoding="utf-8"?>
+<p:sld xmlns:a="http://schemas.openxmlformats.org/drawingml/2006/main" xmlns:r="http://schemas.openxmlformats.org/officeDocument/2006/relationships" xmlns:p="http://schemas.openxmlformats.org/presentationml/2006/main" xmlns:p14="http://schemas.microsoft.com/office/powerpoint/2010/main">
+  <p:cSld>
+    <p:spTree>
+      <p:nvGrpSpPr>
+        <p:cNvPr id="1" name=""/>
+        <p:cNvGrpSpPr/>
+        <p:nvPr/>
+      </p:nvGrpSpPr>
+      <p:grpSpPr>
+        <a:xfrm>
+          <a:off x="0" y="0"/>
+          <a:ext cx="0" cy="0"/>
+          <a:chOff x="0" y="0"/>
+          <a:chExt cx="0" cy="0"/>
+        </a:xfrm>
+      </p:grpSpPr>
+      <p:sp>
+        <p:nvSpPr>
+          <p:cNvPr id="2" name="Rect 0"/>
+          <p:cNvSpPr txBox="1">
+            <a:spLocks/>
+          </p:cNvSpPr>
+          <p:nvPr/>
+        </p:nvSpPr>
+        <p:spPr>
+          <a:xfrm rot="0">
+            <a:off x="4331335" y="412115"/>
+            <a:ext cx="3526155" cy="554990"/>
+          </a:xfrm>
+          <a:prstGeom prst="rect"/>
+          <a:noFill/>
+          <a:ln w="0">
+            <a:noFill/>
+            <a:prstDash/>
+          </a:ln>
+        </p:spPr>
+        <p:txBody>
+          <a:bodyPr wrap="square" lIns="89535" tIns="46355" rIns="89535" bIns="46355" numCol="1" vert="horz" anchor="t">
+            <a:spAutoFit/>
+          </a:bodyPr>
+          <a:lstStyle/>
+          <a:p>
+            <a:pPr marL="0" indent="0" rtl="0" algn="l" defTabSz="914400" eaLnBrk="1" latinLnBrk="0" hangingPunct="1">
+              <a:buFontTx/>
+              <a:buNone/>
+            </a:pPr>
+            <a:r>
+              <a:rPr lang="ko-KR" sz="3000" b="1">
+                <a:solidFill>
+                  <a:schemeClr val="tx1"/>
+                </a:solidFill>
+                <a:latin typeface="맑은 고딕" charset="0"/>
+                <a:ea typeface="맑은 고딕" charset="0"/>
+              </a:rPr>
+              <a:t>여</a:t>
+            </a:r>
+            <a:r>
+              <a:rPr lang="ko-KR" sz="3000" b="1">
+                <a:solidFill>
+                  <a:schemeClr val="tx1"/>
+                </a:solidFill>
+                <a:latin typeface="맑은 고딕" charset="0"/>
+                <a:ea typeface="맑은 고딕" charset="0"/>
+              </a:rPr>
+              <a:t>섯 번째 튜토리얼</a:t>
+            </a:r>
+            <a:r>
+              <a:rPr sz="3000" b="1">
+                <a:solidFill>
+                  <a:schemeClr val="tx1"/>
+                </a:solidFill>
+                <a:latin typeface="맑은 고딕" charset="0"/>
+                <a:ea typeface="맑은 고딕" charset="0"/>
+              </a:rPr>
+              <a:t> </a:t>
+            </a:r>
+            <a:endParaRPr lang="ko-KR" altLang="en-US" sz="3000" b="1">
+              <a:solidFill>
+                <a:schemeClr val="tx1"/>
+              </a:solidFill>
+              <a:latin typeface="맑은 고딕" charset="0"/>
+              <a:ea typeface="맑은 고딕" charset="0"/>
+            </a:endParaRPr>
+          </a:p>
+        </p:txBody>
+      </p:sp>
+      <p:sp>
+        <p:nvSpPr>
+          <p:cNvPr id="11" name="Rect 0"/>
+          <p:cNvSpPr txBox="1">
+            <a:spLocks/>
+          </p:cNvSpPr>
+          <p:nvPr/>
+        </p:nvSpPr>
+        <p:spPr>
+          <a:xfrm>
+            <a:off x="1261745" y="5234940"/>
+            <a:ext cx="4109720" cy="954405"/>
+          </a:xfrm>
+          <a:prstGeom prst="rect"/>
+          <a:noFill/>
+          <a:ln w="0">
+            <a:noFill/>
+            <a:prstDash/>
+          </a:ln>
+        </p:spPr>
+        <p:txBody>
+          <a:bodyPr wrap="square" lIns="89535" tIns="46355" rIns="89535" bIns="46355" numCol="1" vert="horz" anchor="t">
+            <a:spAutoFit/>
+          </a:bodyPr>
+          <a:lstStyle/>
+          <a:p>
+            <a:pPr marL="0" indent="0" rtl="0" algn="l" defTabSz="914400" eaLnBrk="1" latinLnBrk="0" hangingPunct="1">
+              <a:buFontTx/>
+              <a:buNone/>
+            </a:pPr>
+            <a:r>
+              <a:rPr sz="2000" b="1">
+                <a:solidFill>
+                  <a:srgbClr val="0611F2"/>
+                </a:solidFill>
+                <a:latin typeface="맑은 고딕" charset="0"/>
+                <a:ea typeface="맑은 고딕" charset="0"/>
+              </a:rPr>
+              <a:t>15. </a:t>
+            </a:r>
+            <a:r>
+              <a:rPr sz="1800">
+                <a:latin typeface="맑은 고딕" charset="0"/>
+                <a:ea typeface="맑은 고딕" charset="0"/>
+              </a:rPr>
+              <a:t>그리</a:t>
+            </a:r>
+            <a:r>
+              <a:rPr lang="ko-KR" sz="1800">
+                <a:latin typeface="맑은 고딕" charset="0"/>
+                <a:ea typeface="맑은 고딕" charset="0"/>
+              </a:rPr>
+              <a:t>고</a:t>
+            </a:r>
+            <a:r>
+              <a:rPr sz="1800">
+                <a:latin typeface="맑은 고딕" charset="0"/>
+                <a:ea typeface="맑은 고딕" charset="0"/>
+              </a:rPr>
+              <a:t> Running 애니메이션</a:t>
+            </a:r>
+            <a:r>
+              <a:rPr lang="ko-KR" sz="1800">
+                <a:latin typeface="맑은 고딕" charset="0"/>
+                <a:ea typeface="맑은 고딕" charset="0"/>
+              </a:rPr>
+              <a:t>을 </a:t>
+            </a:r>
+            <a:r>
+              <a:rPr lang="ko-KR" sz="1800">
+                <a:latin typeface="맑은 고딕" charset="0"/>
+                <a:ea typeface="맑은 고딕" charset="0"/>
+              </a:rPr>
+              <a:t>선택한 다음</a:t>
+            </a:r>
+            <a:r>
+              <a:rPr sz="1800">
+                <a:latin typeface="맑은 고딕" charset="0"/>
+                <a:ea typeface="맑은 고딕" charset="0"/>
+              </a:rPr>
+              <a:t> In Place를 선택하고 Download 합니다.</a:t>
+            </a:r>
+            <a:endParaRPr lang="ko-KR" altLang="en-US" sz="1800">
+              <a:latin typeface="맑은 고딕" charset="0"/>
+              <a:ea typeface="맑은 고딕" charset="0"/>
+            </a:endParaRPr>
+          </a:p>
+        </p:txBody>
+      </p:sp>
+      <p:pic>
+        <p:nvPicPr>
+          <p:cNvPr id="19" name="그림 5"/>
+          <p:cNvPicPr>
+            <a:picLocks noChangeAspect="1"/>
+          </p:cNvPicPr>
+          <p:nvPr/>
+        </p:nvPicPr>
+        <p:blipFill rotWithShape="1">
+          <a:blip r:embed="rId2" cstate="print">
+            <a:extLst>
+              <a:ext uri="{28A0092B-C50C-407E-A947-70E740481C1C}">
+                <a14:useLocalDpi xmlns:a14="http://schemas.microsoft.com/office/drawing/2010/main" val="0"/>
+              </a:ext>
+            </a:extLst>
+          </a:blip>
+          <a:stretch>
+            <a:fillRect/>
+          </a:stretch>
+        </p:blipFill>
+        <p:spPr>
+          <a:xfrm rot="0">
+            <a:off x="1263650" y="1296670"/>
+            <a:ext cx="4107180" cy="3850005"/>
+          </a:xfrm>
+          <a:prstGeom prst="rect"/>
+          <a:noFill/>
+        </p:spPr>
+      </p:pic>
+      <p:sp>
+        <p:nvSpPr>
+          <p:cNvPr id="20" name="텍스트 상자 6"/>
+          <p:cNvSpPr txBox="1">
+            <a:spLocks/>
+          </p:cNvSpPr>
+          <p:nvPr/>
+        </p:nvSpPr>
+        <p:spPr>
+          <a:xfrm rot="0">
+            <a:off x="6812915" y="4676775"/>
+            <a:ext cx="4053205" cy="1508125"/>
+          </a:xfrm>
+          <a:prstGeom prst="rect"/>
+          <a:noFill/>
+          <a:ln w="0">
+            <a:noFill/>
+            <a:prstDash/>
+          </a:ln>
+        </p:spPr>
+        <p:txBody>
+          <a:bodyPr wrap="square" lIns="89535" tIns="46355" rIns="89535" bIns="46355" vert="horz" anchor="t">
+            <a:spAutoFit/>
+          </a:bodyPr>
+          <a:lstStyle/>
+          <a:p>
+            <a:pPr marL="0" indent="0" rtl="0" algn="l" defTabSz="914400" eaLnBrk="1" latinLnBrk="0" hangingPunct="1">
+              <a:buFontTx/>
+              <a:buNone/>
+            </a:pPr>
+            <a:r>
+              <a:rPr sz="2000" b="1">
+                <a:solidFill>
+                  <a:srgbClr val="0611F2"/>
+                </a:solidFill>
+                <a:latin typeface="맑은 고딕" charset="0"/>
+                <a:ea typeface="맑은 고딕" charset="0"/>
+              </a:rPr>
+              <a:t>1</a:t>
+            </a:r>
+            <a:r>
+              <a:rPr sz="2000" b="1">
+                <a:solidFill>
+                  <a:srgbClr val="0611F2"/>
+                </a:solidFill>
+                <a:latin typeface="맑은 고딕" charset="0"/>
+                <a:ea typeface="맑은 고딕" charset="0"/>
+              </a:rPr>
+              <a:t>6</a:t>
+            </a:r>
+            <a:r>
+              <a:rPr sz="2000" b="1">
+                <a:solidFill>
+                  <a:srgbClr val="0611F2"/>
+                </a:solidFill>
+                <a:latin typeface="맑은 고딕" charset="0"/>
+                <a:ea typeface="맑은 고딕" charset="0"/>
+              </a:rPr>
+              <a:t>. </a:t>
+            </a:r>
+            <a:r>
+              <a:rPr sz="1800">
+                <a:latin typeface="맑은 고딕" charset="0"/>
+                <a:ea typeface="맑은 고딕" charset="0"/>
+              </a:rPr>
+              <a:t>그</a:t>
+            </a:r>
+            <a:r>
+              <a:rPr lang="ko-KR" sz="1800">
+                <a:latin typeface="맑은 고딕" charset="0"/>
+                <a:ea typeface="맑은 고딕" charset="0"/>
+              </a:rPr>
+              <a:t>런 다음</a:t>
+            </a:r>
+            <a:r>
+              <a:rPr sz="1800">
+                <a:latin typeface="맑은 고딕" charset="0"/>
+                <a:ea typeface="맑은 고딕" charset="0"/>
+              </a:rPr>
+              <a:t> Format</a:t>
+            </a:r>
+            <a:r>
+              <a:rPr lang="ko-KR" sz="1800">
+                <a:latin typeface="맑은 고딕" charset="0"/>
+                <a:ea typeface="맑은 고딕" charset="0"/>
+              </a:rPr>
+              <a:t>을</a:t>
+            </a:r>
+            <a:r>
+              <a:rPr sz="1800">
+                <a:latin typeface="맑은 고딕" charset="0"/>
+                <a:ea typeface="맑은 고딕" charset="0"/>
+              </a:rPr>
+              <a:t> FBX for Unity(.fbx)로 설정합니다.</a:t>
+            </a:r>
+            <a:endParaRPr lang="ko-KR" altLang="en-US" sz="1800">
+              <a:latin typeface="맑은 고딕" charset="0"/>
+              <a:ea typeface="맑은 고딕" charset="0"/>
+            </a:endParaRPr>
+          </a:p>
+          <a:p>
+            <a:pPr marL="0" indent="0" rtl="0" algn="l" defTabSz="914400" eaLnBrk="1" latinLnBrk="0" hangingPunct="1">
+              <a:buFontTx/>
+              <a:buNone/>
+            </a:pPr>
+            <a:endParaRPr lang="ko-KR" altLang="en-US" sz="1800">
+              <a:latin typeface="맑은 고딕" charset="0"/>
+              <a:ea typeface="맑은 고딕" charset="0"/>
+            </a:endParaRPr>
+          </a:p>
+          <a:p>
+            <a:pPr marL="0" indent="0" rtl="0" algn="l" defTabSz="914400" eaLnBrk="1" latinLnBrk="0" hangingPunct="1">
+              <a:buFontTx/>
+              <a:buNone/>
+            </a:pPr>
+            <a:r>
+              <a:rPr sz="1800">
+                <a:latin typeface="맑은 고딕" charset="0"/>
+                <a:ea typeface="맑은 고딕" charset="0"/>
+              </a:rPr>
+              <a:t>그다</a:t>
+            </a:r>
+            <a:r>
+              <a:rPr lang="ko-KR" sz="1800">
+                <a:latin typeface="맑은 고딕" charset="0"/>
+                <a:ea typeface="맑은 고딕" charset="0"/>
+              </a:rPr>
+              <a:t>음</a:t>
+            </a:r>
+            <a:r>
+              <a:rPr sz="1800">
+                <a:latin typeface="맑은 고딕" charset="0"/>
+                <a:ea typeface="맑은 고딕" charset="0"/>
+              </a:rPr>
+              <a:t> Skin은 Whitout Skin으로 설정</a:t>
+            </a:r>
+            <a:r>
+              <a:rPr sz="1800">
+                <a:latin typeface="맑은 고딕" charset="0"/>
+                <a:ea typeface="맑은 고딕" charset="0"/>
+              </a:rPr>
+              <a:t>하</a:t>
+            </a:r>
+            <a:r>
+              <a:rPr lang="ko-KR" sz="1800">
+                <a:latin typeface="맑은 고딕" charset="0"/>
+                <a:ea typeface="맑은 고딕" charset="0"/>
+              </a:rPr>
+              <a:t>고</a:t>
+            </a:r>
+            <a:r>
+              <a:rPr sz="1800">
+                <a:latin typeface="맑은 고딕" charset="0"/>
+                <a:ea typeface="맑은 고딕" charset="0"/>
+              </a:rPr>
+              <a:t> Download</a:t>
+            </a:r>
+            <a:r>
+              <a:rPr lang="ko-KR" sz="1800">
+                <a:latin typeface="맑은 고딕" charset="0"/>
+                <a:ea typeface="맑은 고딕" charset="0"/>
+              </a:rPr>
+              <a:t>를 선택</a:t>
+            </a:r>
+            <a:r>
+              <a:rPr sz="1800">
+                <a:latin typeface="맑은 고딕" charset="0"/>
+                <a:ea typeface="맑은 고딕" charset="0"/>
+              </a:rPr>
+              <a:t>합니다.</a:t>
+            </a:r>
+            <a:endParaRPr lang="ko-KR" altLang="en-US" sz="1800">
+              <a:latin typeface="맑은 고딕" charset="0"/>
+              <a:ea typeface="맑은 고딕" charset="0"/>
+            </a:endParaRPr>
+          </a:p>
+        </p:txBody>
+      </p:sp>
+      <p:pic>
+        <p:nvPicPr>
+          <p:cNvPr id="21" name="그림 7"/>
+          <p:cNvPicPr>
+            <a:picLocks noChangeAspect="1"/>
+          </p:cNvPicPr>
+          <p:nvPr/>
+        </p:nvPicPr>
+        <p:blipFill rotWithShape="1">
+          <a:blip r:embed="rId3" cstate="hqprint">
+            <a:extLst>
+              <a:ext uri="{28A0092B-C50C-407E-A947-70E740481C1C}">
+                <a14:useLocalDpi xmlns:a14="http://schemas.microsoft.com/office/drawing/2010/main"/>
+              </a:ext>
+            </a:extLst>
+          </a:blip>
+          <a:stretch>
+            <a:fillRect/>
+          </a:stretch>
+        </p:blipFill>
+        <p:spPr>
+          <a:xfrm rot="0">
+            <a:off x="6816725" y="1287780"/>
+            <a:ext cx="4051300" cy="3327400"/>
+          </a:xfrm>
+          <a:prstGeom prst="rect"/>
+          <a:noFill/>
+        </p:spPr>
+      </p:pic>
+    </p:spTree>
+  </p:cSld>
+  <p:clrMapOvr>
+    <a:masterClrMapping/>
+  </p:clrMapOvr>
+  <mc:AlternateContent xmlns:mc="http://schemas.openxmlformats.org/markup-compatibility/2006">
+    <mc:Choice xmlns:p14="http://schemas.microsoft.com/office/powerpoint/2010/main" Requires="p14">
+      <p:transition spd="slow" p14:dur="1000"/>
+    </mc:Choice>
+    <mc:Fallback>
+      <p:transition spd="slow"/>
+    </mc:Fallback>
+  </mc:AlternateContent>
+  <p:timing>
+    <p:tnLst>
+      <p:par>
+        <p:cTn id="1" dur="indefinite" restart="never" nodeType="tmRoot"/>
+      </p:par>
+    </p:tnLst>
+  </p:timing>
+</p:sld>
+</file>
+
+<file path=ppt/slides/slide7.xml><?xml version="1.0" encoding="utf-8"?>
+<p:sld xmlns:a="http://schemas.openxmlformats.org/drawingml/2006/main" xmlns:r="http://schemas.openxmlformats.org/officeDocument/2006/relationships" xmlns:p="http://schemas.openxmlformats.org/presentationml/2006/main" xmlns:p14="http://schemas.microsoft.com/office/powerpoint/2010/main">
+  <p:cSld>
+    <p:spTree>
+      <p:nvGrpSpPr>
+        <p:cNvPr id="1" name=""/>
+        <p:cNvGrpSpPr/>
+        <p:nvPr/>
+      </p:nvGrpSpPr>
+      <p:grpSpPr>
+        <a:xfrm>
+          <a:off x="0" y="0"/>
+          <a:ext cx="0" cy="0"/>
+          <a:chOff x="0" y="0"/>
+          <a:chExt cx="0" cy="0"/>
+        </a:xfrm>
+      </p:grpSpPr>
+      <p:sp>
+        <p:nvSpPr>
+          <p:cNvPr id="2" name="Rect 0"/>
+          <p:cNvSpPr txBox="1">
+            <a:spLocks/>
+          </p:cNvSpPr>
+          <p:nvPr/>
+        </p:nvSpPr>
+        <p:spPr>
+          <a:xfrm rot="0">
+            <a:off x="4331335" y="412115"/>
+            <a:ext cx="3526790" cy="554990"/>
+          </a:xfrm>
+          <a:prstGeom prst="rect"/>
+          <a:noFill/>
+          <a:ln w="0">
+            <a:noFill/>
+            <a:prstDash/>
+          </a:ln>
+        </p:spPr>
+        <p:txBody>
+          <a:bodyPr wrap="square" lIns="89535" tIns="46355" rIns="89535" bIns="46355" numCol="1" vert="horz" anchor="t">
+            <a:spAutoFit/>
+          </a:bodyPr>
+          <a:lstStyle/>
+          <a:p>
+            <a:pPr marL="0" indent="0" rtl="0" algn="l" defTabSz="914400" eaLnBrk="1" latinLnBrk="0" hangingPunct="1">
+              <a:buFontTx/>
+              <a:buNone/>
+            </a:pPr>
+            <a:r>
+              <a:rPr lang="ko-KR" sz="3000" b="1">
+                <a:solidFill>
+                  <a:schemeClr val="tx1"/>
+                </a:solidFill>
+                <a:latin typeface="맑은 고딕" charset="0"/>
+                <a:ea typeface="맑은 고딕" charset="0"/>
+              </a:rPr>
+              <a:t>일곱</a:t>
+            </a:r>
+            <a:r>
+              <a:rPr lang="ko-KR" sz="3000" b="1">
+                <a:solidFill>
+                  <a:schemeClr val="tx1"/>
+                </a:solidFill>
+                <a:latin typeface="맑은 고딕" charset="0"/>
+                <a:ea typeface="맑은 고딕" charset="0"/>
+              </a:rPr>
+              <a:t> 번째 튜토리얼</a:t>
+            </a:r>
+            <a:r>
+              <a:rPr sz="3000" b="1">
+                <a:solidFill>
+                  <a:schemeClr val="tx1"/>
+                </a:solidFill>
+                <a:latin typeface="맑은 고딕" charset="0"/>
+                <a:ea typeface="맑은 고딕" charset="0"/>
+              </a:rPr>
+              <a:t> </a:t>
+            </a:r>
+            <a:endParaRPr lang="ko-KR" altLang="en-US" sz="3000" b="1">
+              <a:solidFill>
+                <a:schemeClr val="tx1"/>
+              </a:solidFill>
+              <a:latin typeface="맑은 고딕" charset="0"/>
+              <a:ea typeface="맑은 고딕" charset="0"/>
+            </a:endParaRPr>
+          </a:p>
+        </p:txBody>
+      </p:sp>
+      <p:sp>
+        <p:nvSpPr>
+          <p:cNvPr id="20" name="Rect 0"/>
+          <p:cNvSpPr txBox="1">
+            <a:spLocks/>
+          </p:cNvSpPr>
+          <p:nvPr/>
+        </p:nvSpPr>
+        <p:spPr>
+          <a:xfrm rot="0">
+            <a:off x="6821170" y="5233670"/>
+            <a:ext cx="4194175" cy="954405"/>
+          </a:xfrm>
+          <a:prstGeom prst="rect"/>
+          <a:noFill/>
+          <a:ln w="0">
+            <a:noFill/>
+            <a:prstDash/>
+          </a:ln>
+        </p:spPr>
+        <p:txBody>
+          <a:bodyPr wrap="square" lIns="89535" tIns="46355" rIns="89535" bIns="46355" numCol="1" vert="horz" anchor="t">
+            <a:spAutoFit/>
+          </a:bodyPr>
+          <a:lstStyle/>
+          <a:p>
+            <a:pPr marL="0" indent="0" rtl="0" algn="l" defTabSz="914400" eaLnBrk="1" latinLnBrk="0" hangingPunct="1">
+              <a:buFontTx/>
+              <a:buNone/>
+            </a:pPr>
+            <a:r>
+              <a:rPr sz="2000" b="1">
+                <a:solidFill>
+                  <a:srgbClr val="0611F2"/>
+                </a:solidFill>
+                <a:latin typeface="맑은 고딕" charset="0"/>
+                <a:ea typeface="맑은 고딕" charset="0"/>
+              </a:rPr>
+              <a:t>1</a:t>
+            </a:r>
+            <a:r>
+              <a:rPr sz="2000" b="1">
+                <a:solidFill>
+                  <a:srgbClr val="0611F2"/>
+                </a:solidFill>
+                <a:latin typeface="맑은 고딕" charset="0"/>
+                <a:ea typeface="맑은 고딕" charset="0"/>
+              </a:rPr>
+              <a:t>9</a:t>
+            </a:r>
+            <a:r>
+              <a:rPr sz="2000" b="1">
+                <a:solidFill>
+                  <a:srgbClr val="0611F2"/>
+                </a:solidFill>
+                <a:latin typeface="맑은 고딕" charset="0"/>
+                <a:ea typeface="맑은 고딕" charset="0"/>
+              </a:rPr>
+              <a:t>. </a:t>
+            </a:r>
+            <a:r>
+              <a:rPr sz="1800">
+                <a:latin typeface="맑은 고딕" charset="0"/>
+                <a:ea typeface="맑은 고딕" charset="0"/>
+              </a:rPr>
+              <a:t>그</a:t>
+            </a:r>
+            <a:r>
+              <a:rPr lang="ko-KR" sz="1800">
+                <a:latin typeface="맑은 고딕" charset="0"/>
+                <a:ea typeface="맑은 고딕" charset="0"/>
+              </a:rPr>
+              <a:t>리고 erika_archer@Running 애니메이션 파일의 이름 Running이라는 이름으로 정의합니다.</a:t>
+            </a:r>
+            <a:endParaRPr lang="ko-KR" altLang="en-US" sz="1800">
+              <a:latin typeface="맑은 고딕" charset="0"/>
+              <a:ea typeface="맑은 고딕" charset="0"/>
+            </a:endParaRPr>
+          </a:p>
+        </p:txBody>
+      </p:sp>
+      <p:pic>
+        <p:nvPicPr>
+          <p:cNvPr id="22" name="그림 1"/>
+          <p:cNvPicPr>
+            <a:picLocks noChangeAspect="1"/>
+          </p:cNvPicPr>
+          <p:nvPr/>
+        </p:nvPicPr>
+        <p:blipFill rotWithShape="1">
+          <a:blip r:embed="rId2" cstate="print">
+            <a:extLst>
+              <a:ext uri="{28A0092B-C50C-407E-A947-70E740481C1C}">
+                <a14:useLocalDpi xmlns:a14="http://schemas.microsoft.com/office/drawing/2010/main" val="0"/>
+              </a:ext>
+            </a:extLst>
+          </a:blip>
+          <a:stretch>
+            <a:fillRect/>
+          </a:stretch>
+        </p:blipFill>
+        <p:spPr>
+          <a:xfrm rot="0">
+            <a:off x="1266190" y="1285240"/>
+            <a:ext cx="1003935" cy="952500"/>
+          </a:xfrm>
+          <a:prstGeom prst="roundRect"/>
+          <a:solidFill>
+            <a:srgbClr val="EDEDED"/>
+          </a:solidFill>
+        </p:spPr>
+      </p:pic>
+      <p:pic>
+        <p:nvPicPr>
+          <p:cNvPr id="23" name="그림 2"/>
           <p:cNvPicPr>
             <a:picLocks noChangeAspect="1"/>
           </p:cNvPicPr>
@@ -7178,8 +10031,8 @@
         </p:blipFill>
         <p:spPr>
           <a:xfrm rot="0">
-            <a:off x="8204835" y="1288415"/>
-            <a:ext cx="2743835" cy="1131570"/>
+            <a:off x="2486025" y="1300480"/>
+            <a:ext cx="2883535" cy="927735"/>
           </a:xfrm>
           <a:prstGeom prst="roundRect"/>
           <a:solidFill>
@@ -7189,7 +10042,484 @@
       </p:pic>
       <p:pic>
         <p:nvPicPr>
-          <p:cNvPr id="14" name="그림 31" descr="C:/Users/Admin1/AppData/Roaming/PolarisOffice/ETemp/5024_9141648/fImage55771556962.png"/>
+          <p:cNvPr id="24" name="그림 8"/>
+          <p:cNvPicPr>
+            <a:picLocks noChangeAspect="1"/>
+          </p:cNvPicPr>
+          <p:nvPr/>
+        </p:nvPicPr>
+        <p:blipFill rotWithShape="1">
+          <a:blip r:embed="rId4" cstate="hqprint">
+            <a:extLst>
+              <a:ext uri="{28A0092B-C50C-407E-A947-70E740481C1C}">
+                <a14:useLocalDpi xmlns:a14="http://schemas.microsoft.com/office/drawing/2010/main"/>
+              </a:ext>
+            </a:extLst>
+          </a:blip>
+          <a:stretch>
+            <a:fillRect/>
+          </a:stretch>
+        </p:blipFill>
+        <p:spPr>
+          <a:xfrm rot="16200000">
+            <a:off x="2198370" y="1430020"/>
+            <a:ext cx="348615" cy="660400"/>
+          </a:xfrm>
+          <a:prstGeom prst="rect"/>
+          <a:noFill/>
+        </p:spPr>
+      </p:pic>
+      <p:sp>
+        <p:nvSpPr>
+          <p:cNvPr id="25" name="텍스트 상자 9"/>
+          <p:cNvSpPr txBox="1">
+            <a:spLocks/>
+          </p:cNvSpPr>
+          <p:nvPr/>
+        </p:nvSpPr>
+        <p:spPr>
+          <a:xfrm rot="0">
+            <a:off x="1261110" y="2357755"/>
+            <a:ext cx="4110355" cy="955040"/>
+          </a:xfrm>
+          <a:prstGeom prst="rect"/>
+          <a:noFill/>
+          <a:ln w="0">
+            <a:noFill/>
+            <a:prstDash/>
+          </a:ln>
+        </p:spPr>
+        <p:txBody>
+          <a:bodyPr wrap="square" lIns="89535" tIns="46355" rIns="89535" bIns="46355" numCol="1" vert="horz" anchor="t">
+            <a:spAutoFit/>
+          </a:bodyPr>
+          <a:lstStyle/>
+          <a:p>
+            <a:pPr marL="0" indent="0" rtl="0" algn="l" defTabSz="914400" eaLnBrk="1" latinLnBrk="0" hangingPunct="1">
+              <a:buFontTx/>
+              <a:buNone/>
+            </a:pPr>
+            <a:r>
+              <a:rPr sz="2000" b="1">
+                <a:solidFill>
+                  <a:srgbClr val="0611F2"/>
+                </a:solidFill>
+                <a:latin typeface="맑은 고딕" charset="0"/>
+                <a:ea typeface="맑은 고딕" charset="0"/>
+              </a:rPr>
+              <a:t>17. </a:t>
+            </a:r>
+            <a:r>
+              <a:rPr sz="1800">
+                <a:latin typeface="맑은 고딕" charset="0"/>
+                <a:ea typeface="맑은 고딕" charset="0"/>
+              </a:rPr>
+              <a:t>이제 애니메이션 파일을 유니티 프로젝트에 있</a:t>
+            </a:r>
+            <a:r>
+              <a:rPr lang="ko-KR" sz="1800">
+                <a:latin typeface="맑은 고딕" charset="0"/>
+                <a:ea typeface="맑은 고딕" charset="0"/>
+              </a:rPr>
+              <a:t>는 Animation 폴더에 저장합니다.</a:t>
+            </a:r>
+            <a:endParaRPr lang="ko-KR" altLang="en-US" sz="1800">
+              <a:latin typeface="맑은 고딕" charset="0"/>
+              <a:ea typeface="맑은 고딕" charset="0"/>
+            </a:endParaRPr>
+          </a:p>
+        </p:txBody>
+      </p:sp>
+      <p:sp>
+        <p:nvSpPr>
+          <p:cNvPr id="27" name="텍스트 상자 12"/>
+          <p:cNvSpPr txBox="1">
+            <a:spLocks/>
+          </p:cNvSpPr>
+          <p:nvPr/>
+        </p:nvSpPr>
+        <p:spPr>
+          <a:xfrm rot="0">
+            <a:off x="1261745" y="5508625"/>
+            <a:ext cx="4117340" cy="677545"/>
+          </a:xfrm>
+          <a:prstGeom prst="rect"/>
+          <a:noFill/>
+          <a:ln w="0">
+            <a:noFill/>
+            <a:prstDash/>
+          </a:ln>
+        </p:spPr>
+        <p:txBody>
+          <a:bodyPr wrap="square" lIns="89535" tIns="46355" rIns="89535" bIns="46355" vert="horz" anchor="t">
+            <a:spAutoFit/>
+          </a:bodyPr>
+          <a:lstStyle/>
+          <a:p>
+            <a:pPr marL="0" indent="0" rtl="0" algn="l" defTabSz="914400" eaLnBrk="1" latinLnBrk="0" hangingPunct="1">
+              <a:buFontTx/>
+              <a:buNone/>
+            </a:pPr>
+            <a:r>
+              <a:rPr sz="2000" b="1">
+                <a:solidFill>
+                  <a:srgbClr val="0611F2"/>
+                </a:solidFill>
+                <a:latin typeface="맑은 고딕" charset="0"/>
+                <a:ea typeface="맑은 고딕" charset="0"/>
+              </a:rPr>
+              <a:t>1</a:t>
+            </a:r>
+            <a:r>
+              <a:rPr sz="2000" b="1">
+                <a:solidFill>
+                  <a:srgbClr val="0611F2"/>
+                </a:solidFill>
+                <a:latin typeface="맑은 고딕" charset="0"/>
+                <a:ea typeface="맑은 고딕" charset="0"/>
+              </a:rPr>
+              <a:t>8</a:t>
+            </a:r>
+            <a:r>
+              <a:rPr sz="2000" b="1">
+                <a:solidFill>
+                  <a:srgbClr val="0611F2"/>
+                </a:solidFill>
+                <a:latin typeface="맑은 고딕" charset="0"/>
+                <a:ea typeface="맑은 고딕" charset="0"/>
+              </a:rPr>
+              <a:t>. </a:t>
+            </a:r>
+            <a:r>
+              <a:rPr sz="1800">
+                <a:latin typeface="맑은 고딕" charset="0"/>
+                <a:ea typeface="맑은 고딕" charset="0"/>
+              </a:rPr>
+              <a:t>그런 다음 애니메이터 컨트롤러를 선택하여 Base Layer에 들어옵니다. </a:t>
+            </a:r>
+            <a:endParaRPr lang="ko-KR" altLang="en-US" sz="1800">
+              <a:latin typeface="맑은 고딕" charset="0"/>
+              <a:ea typeface="맑은 고딕" charset="0"/>
+            </a:endParaRPr>
+          </a:p>
+        </p:txBody>
+      </p:sp>
+      <p:pic>
+        <p:nvPicPr>
+          <p:cNvPr id="28" name="그림 13"/>
+          <p:cNvPicPr>
+            <a:picLocks noChangeAspect="1"/>
+          </p:cNvPicPr>
+          <p:nvPr/>
+        </p:nvPicPr>
+        <p:blipFill rotWithShape="1">
+          <a:blip r:embed="rId5" cstate="print">
+            <a:extLst>
+              <a:ext uri="{28A0092B-C50C-407E-A947-70E740481C1C}">
+                <a14:useLocalDpi xmlns:a14="http://schemas.microsoft.com/office/drawing/2010/main" val="0"/>
+              </a:ext>
+            </a:extLst>
+          </a:blip>
+          <a:stretch>
+            <a:fillRect/>
+          </a:stretch>
+        </p:blipFill>
+        <p:spPr>
+          <a:xfrm rot="0">
+            <a:off x="1263650" y="3416935"/>
+            <a:ext cx="4107180" cy="2012315"/>
+          </a:xfrm>
+          <a:prstGeom prst="rect"/>
+          <a:noFill/>
+        </p:spPr>
+      </p:pic>
+      <p:pic>
+        <p:nvPicPr>
+          <p:cNvPr id="29" name="그림 1"/>
+          <p:cNvPicPr>
+            <a:picLocks noChangeAspect="1"/>
+          </p:cNvPicPr>
+          <p:nvPr/>
+        </p:nvPicPr>
+        <p:blipFill rotWithShape="1">
+          <a:blip r:embed="rId6" cstate="print">
+            <a:extLst>
+              <a:ext uri="{28A0092B-C50C-407E-A947-70E740481C1C}">
+                <a14:useLocalDpi xmlns:a14="http://schemas.microsoft.com/office/drawing/2010/main" val="0"/>
+              </a:ext>
+            </a:extLst>
+          </a:blip>
+          <a:stretch>
+            <a:fillRect/>
+          </a:stretch>
+        </p:blipFill>
+        <p:spPr>
+          <a:xfrm rot="0">
+            <a:off x="6808470" y="1296670"/>
+            <a:ext cx="4206875" cy="3866515"/>
+          </a:xfrm>
+          <a:prstGeom prst="rect"/>
+          <a:noFill/>
+        </p:spPr>
+      </p:pic>
+    </p:spTree>
+  </p:cSld>
+  <p:clrMapOvr>
+    <a:masterClrMapping/>
+  </p:clrMapOvr>
+  <mc:AlternateContent xmlns:mc="http://schemas.openxmlformats.org/markup-compatibility/2006">
+    <mc:Choice xmlns:p14="http://schemas.microsoft.com/office/powerpoint/2010/main" Requires="p14">
+      <p:transition spd="slow" p14:dur="1000"/>
+    </mc:Choice>
+    <mc:Fallback>
+      <p:transition spd="slow"/>
+    </mc:Fallback>
+  </mc:AlternateContent>
+  <p:timing>
+    <p:tnLst>
+      <p:par>
+        <p:cTn id="1" dur="indefinite" restart="never" nodeType="tmRoot"/>
+      </p:par>
+    </p:tnLst>
+  </p:timing>
+</p:sld>
+</file>
+
+<file path=ppt/slides/slide8.xml><?xml version="1.0" encoding="utf-8"?>
+<p:sld xmlns:a="http://schemas.openxmlformats.org/drawingml/2006/main" xmlns:r="http://schemas.openxmlformats.org/officeDocument/2006/relationships" xmlns:p="http://schemas.openxmlformats.org/presentationml/2006/main" xmlns:p14="http://schemas.microsoft.com/office/powerpoint/2010/main">
+  <p:cSld>
+    <p:spTree>
+      <p:nvGrpSpPr>
+        <p:cNvPr id="1" name=""/>
+        <p:cNvGrpSpPr/>
+        <p:nvPr/>
+      </p:nvGrpSpPr>
+      <p:grpSpPr>
+        <a:xfrm>
+          <a:off x="0" y="0"/>
+          <a:ext cx="0" cy="0"/>
+          <a:chOff x="0" y="0"/>
+          <a:chExt cx="0" cy="0"/>
+        </a:xfrm>
+      </p:grpSpPr>
+      <p:sp>
+        <p:nvSpPr>
+          <p:cNvPr id="2" name="Rect 0"/>
+          <p:cNvSpPr txBox="1">
+            <a:spLocks/>
+          </p:cNvSpPr>
+          <p:nvPr/>
+        </p:nvSpPr>
+        <p:spPr>
+          <a:xfrm rot="0">
+            <a:off x="4331335" y="412115"/>
+            <a:ext cx="3527425" cy="554990"/>
+          </a:xfrm>
+          <a:prstGeom prst="rect"/>
+          <a:noFill/>
+          <a:ln w="0">
+            <a:noFill/>
+            <a:prstDash/>
+          </a:ln>
+        </p:spPr>
+        <p:txBody>
+          <a:bodyPr wrap="square" lIns="89535" tIns="46355" rIns="89535" bIns="46355" numCol="1" vert="horz" anchor="t">
+            <a:spAutoFit/>
+          </a:bodyPr>
+          <a:lstStyle/>
+          <a:p>
+            <a:pPr marL="0" indent="0" rtl="0" algn="l" defTabSz="914400" eaLnBrk="1" latinLnBrk="0" hangingPunct="1">
+              <a:buFontTx/>
+              <a:buNone/>
+            </a:pPr>
+            <a:r>
+              <a:rPr lang="ko-KR" sz="3000" b="1">
+                <a:solidFill>
+                  <a:schemeClr val="tx1"/>
+                </a:solidFill>
+                <a:latin typeface="맑은 고딕" charset="0"/>
+                <a:ea typeface="맑은 고딕" charset="0"/>
+              </a:rPr>
+              <a:t>여덟</a:t>
+            </a:r>
+            <a:r>
+              <a:rPr lang="ko-KR" sz="3000" b="1">
+                <a:solidFill>
+                  <a:schemeClr val="tx1"/>
+                </a:solidFill>
+                <a:latin typeface="맑은 고딕" charset="0"/>
+                <a:ea typeface="맑은 고딕" charset="0"/>
+              </a:rPr>
+              <a:t> 번째 튜토리얼</a:t>
+            </a:r>
+            <a:r>
+              <a:rPr sz="3000" b="1">
+                <a:solidFill>
+                  <a:schemeClr val="tx1"/>
+                </a:solidFill>
+                <a:latin typeface="맑은 고딕" charset="0"/>
+                <a:ea typeface="맑은 고딕" charset="0"/>
+              </a:rPr>
+              <a:t> </a:t>
+            </a:r>
+            <a:endParaRPr lang="ko-KR" altLang="en-US" sz="3000" b="1">
+              <a:solidFill>
+                <a:schemeClr val="tx1"/>
+              </a:solidFill>
+              <a:latin typeface="맑은 고딕" charset="0"/>
+              <a:ea typeface="맑은 고딕" charset="0"/>
+            </a:endParaRPr>
+          </a:p>
+        </p:txBody>
+      </p:sp>
+      <p:sp>
+        <p:nvSpPr>
+          <p:cNvPr id="27" name="Rect 0"/>
+          <p:cNvSpPr txBox="1">
+            <a:spLocks/>
+          </p:cNvSpPr>
+          <p:nvPr/>
+        </p:nvSpPr>
+        <p:spPr>
+          <a:xfrm rot="0">
+            <a:off x="1263650" y="5234305"/>
+            <a:ext cx="4124325" cy="954405"/>
+          </a:xfrm>
+          <a:prstGeom prst="rect"/>
+          <a:noFill/>
+          <a:ln w="0">
+            <a:noFill/>
+            <a:prstDash/>
+          </a:ln>
+        </p:spPr>
+        <p:txBody>
+          <a:bodyPr wrap="square" lIns="89535" tIns="46355" rIns="89535" bIns="46355" numCol="1" vert="horz" anchor="t">
+            <a:spAutoFit/>
+          </a:bodyPr>
+          <a:lstStyle/>
+          <a:p>
+            <a:pPr marL="0" indent="0" rtl="0" algn="l" defTabSz="914400" eaLnBrk="1" latinLnBrk="0" hangingPunct="1">
+              <a:buFontTx/>
+              <a:buNone/>
+            </a:pPr>
+            <a:r>
+              <a:rPr sz="2000" b="1">
+                <a:solidFill>
+                  <a:srgbClr val="0611F2"/>
+                </a:solidFill>
+                <a:latin typeface="맑은 고딕" charset="0"/>
+                <a:ea typeface="맑은 고딕" charset="0"/>
+              </a:rPr>
+              <a:t>21</a:t>
+            </a:r>
+            <a:r>
+              <a:rPr sz="2000" b="1">
+                <a:solidFill>
+                  <a:srgbClr val="0611F2"/>
+                </a:solidFill>
+                <a:latin typeface="맑은 고딕" charset="0"/>
+                <a:ea typeface="맑은 고딕" charset="0"/>
+              </a:rPr>
+              <a:t>. </a:t>
+            </a:r>
+            <a:r>
+              <a:rPr lang="ko-KR" sz="1800">
+                <a:latin typeface="맑은 고딕" charset="0"/>
+                <a:ea typeface="맑은 고딕" charset="0"/>
+              </a:rPr>
+              <a:t>마지막으로</a:t>
+            </a:r>
+            <a:r>
+              <a:rPr sz="1800">
+                <a:latin typeface="맑은 고딕" charset="0"/>
+                <a:ea typeface="맑은 고딕" charset="0"/>
+              </a:rPr>
+              <a:t> </a:t>
+            </a:r>
+            <a:r>
+              <a:rPr lang="ko-KR" sz="1800">
+                <a:latin typeface="맑은 고딕" charset="0"/>
+                <a:ea typeface="맑은 고딕" charset="0"/>
+              </a:rPr>
+              <a:t>Running 애니메이션에 Make Transition을 생성하고 Exit에 연결합니다.</a:t>
+            </a:r>
+            <a:r>
+              <a:rPr sz="1800">
+                <a:latin typeface="맑은 고딕" charset="0"/>
+                <a:ea typeface="맑은 고딕" charset="0"/>
+              </a:rPr>
+              <a:t> </a:t>
+            </a:r>
+            <a:endParaRPr lang="ko-KR" altLang="en-US" sz="1800">
+              <a:latin typeface="맑은 고딕" charset="0"/>
+              <a:ea typeface="맑은 고딕" charset="0"/>
+            </a:endParaRPr>
+          </a:p>
+        </p:txBody>
+      </p:sp>
+      <p:pic>
+        <p:nvPicPr>
+          <p:cNvPr id="30" name="그림 5"/>
+          <p:cNvPicPr>
+            <a:picLocks noChangeAspect="1"/>
+          </p:cNvPicPr>
+          <p:nvPr/>
+        </p:nvPicPr>
+        <p:blipFill rotWithShape="1">
+          <a:blip r:embed="rId2" cstate="hqprint">
+            <a:extLst>
+              <a:ext uri="{28A0092B-C50C-407E-A947-70E740481C1C}">
+                <a14:useLocalDpi xmlns:a14="http://schemas.microsoft.com/office/drawing/2010/main"/>
+              </a:ext>
+            </a:extLst>
+          </a:blip>
+          <a:stretch>
+            <a:fillRect/>
+          </a:stretch>
+        </p:blipFill>
+        <p:spPr>
+          <a:xfrm rot="0">
+            <a:off x="2869565" y="1288415"/>
+            <a:ext cx="2510155" cy="1329690"/>
+          </a:xfrm>
+          <a:prstGeom prst="roundRect"/>
+          <a:solidFill>
+            <a:srgbClr val="EDEDED"/>
+          </a:solidFill>
+        </p:spPr>
+      </p:pic>
+      <p:pic>
+        <p:nvPicPr>
+          <p:cNvPr id="31" name="그림 6"/>
+          <p:cNvPicPr>
+            <a:picLocks noChangeAspect="1"/>
+          </p:cNvPicPr>
+          <p:nvPr/>
+        </p:nvPicPr>
+        <p:blipFill rotWithShape="1">
+          <a:blip r:embed="rId3" cstate="hqprint">
+            <a:extLst>
+              <a:ext uri="{28A0092B-C50C-407E-A947-70E740481C1C}">
+                <a14:useLocalDpi xmlns:a14="http://schemas.microsoft.com/office/drawing/2010/main"/>
+              </a:ext>
+            </a:extLst>
+          </a:blip>
+          <a:stretch>
+            <a:fillRect/>
+          </a:stretch>
+        </p:blipFill>
+        <p:spPr>
+          <a:xfrm rot="0">
+            <a:off x="2298700" y="1743710"/>
+            <a:ext cx="495300" cy="426085"/>
+          </a:xfrm>
+          <a:prstGeom prst="rect"/>
+          <a:noFill/>
+        </p:spPr>
+      </p:pic>
+      <p:pic>
+        <p:nvPicPr>
+          <p:cNvPr id="32" name="그림 10"/>
           <p:cNvPicPr>
             <a:picLocks noChangeAspect="1"/>
           </p:cNvPicPr>
@@ -7209,8 +10539,8 @@
         </p:blipFill>
         <p:spPr>
           <a:xfrm rot="0">
-            <a:off x="6849745" y="1295400"/>
-            <a:ext cx="1189355" cy="1114425"/>
+            <a:off x="1260475" y="1479550"/>
+            <a:ext cx="951230" cy="956945"/>
           </a:xfrm>
           <a:prstGeom prst="roundRect"/>
           <a:solidFill>
@@ -7218,9 +10548,743 @@
           </a:solidFill>
         </p:spPr>
       </p:pic>
+      <p:sp>
+        <p:nvSpPr>
+          <p:cNvPr id="33" name="텍스트 상자 13"/>
+          <p:cNvSpPr txBox="1">
+            <a:spLocks/>
+          </p:cNvSpPr>
+          <p:nvPr/>
+        </p:nvSpPr>
+        <p:spPr>
+          <a:xfrm rot="0">
+            <a:off x="1266190" y="2718435"/>
+            <a:ext cx="4112895" cy="584835"/>
+          </a:xfrm>
+          <a:prstGeom prst="rect"/>
+          <a:noFill/>
+        </p:spPr>
+        <p:txBody>
+          <a:bodyPr wrap="square" lIns="0" tIns="0" rIns="0" bIns="0" vert="horz" anchor="t">
+            <a:noAutofit/>
+          </a:bodyPr>
+          <a:lstStyle/>
+          <a:p>
+            <a:pPr marL="0" indent="0" rtl="0" algn="l" defTabSz="914400" eaLnBrk="1" latinLnBrk="0" hangingPunct="1">
+              <a:buFontTx/>
+              <a:buNone/>
+            </a:pPr>
+            <a:r>
+              <a:rPr sz="2000" b="1">
+                <a:solidFill>
+                  <a:srgbClr val="0611F2"/>
+                </a:solidFill>
+                <a:latin typeface="맑은 고딕" charset="0"/>
+                <a:ea typeface="맑은 고딕" charset="0"/>
+              </a:rPr>
+              <a:t>2</a:t>
+            </a:r>
+            <a:r>
+              <a:rPr lang="ko-KR" sz="2000" b="1">
+                <a:solidFill>
+                  <a:srgbClr val="0611F2"/>
+                </a:solidFill>
+                <a:latin typeface="맑은 고딕" charset="0"/>
+                <a:ea typeface="맑은 고딕" charset="0"/>
+              </a:rPr>
+              <a:t>0</a:t>
+            </a:r>
+            <a:r>
+              <a:rPr sz="2000" b="1">
+                <a:solidFill>
+                  <a:srgbClr val="0611F2"/>
+                </a:solidFill>
+                <a:latin typeface="맑은 고딕" charset="0"/>
+                <a:ea typeface="맑은 고딕" charset="0"/>
+              </a:rPr>
+              <a:t>. </a:t>
+            </a:r>
+            <a:r>
+              <a:rPr sz="1800">
+                <a:latin typeface="맑은 고딕" charset="0"/>
+                <a:ea typeface="맑은 고딕" charset="0"/>
+              </a:rPr>
+              <a:t>그다</a:t>
+            </a:r>
+            <a:r>
+              <a:rPr lang="ko-KR" sz="1800">
+                <a:latin typeface="맑은 고딕" charset="0"/>
+                <a:ea typeface="맑은 고딕" charset="0"/>
+              </a:rPr>
+              <a:t>음</a:t>
+            </a:r>
+            <a:r>
+              <a:rPr sz="1800">
+                <a:latin typeface="맑은 고딕" charset="0"/>
+                <a:ea typeface="맑은 고딕" charset="0"/>
+              </a:rPr>
+              <a:t> </a:t>
+            </a:r>
+            <a:r>
+              <a:rPr lang="ko-KR" sz="1800">
+                <a:latin typeface="맑은 고딕" charset="0"/>
+                <a:ea typeface="맑은 고딕" charset="0"/>
+              </a:rPr>
+              <a:t>Running </a:t>
+            </a:r>
+            <a:r>
+              <a:rPr sz="1800">
+                <a:latin typeface="맑은 고딕" charset="0"/>
+                <a:ea typeface="맑은 고딕" charset="0"/>
+              </a:rPr>
+              <a:t>애니메이션을 Base Layer에 추가합니다.</a:t>
+            </a:r>
+            <a:endParaRPr lang="ko-KR" altLang="en-US" sz="1800">
+              <a:latin typeface="맑은 고딕" charset="0"/>
+              <a:ea typeface="맑은 고딕" charset="0"/>
+            </a:endParaRPr>
+          </a:p>
+        </p:txBody>
+      </p:sp>
       <p:pic>
         <p:nvPicPr>
-          <p:cNvPr id="15" name="그림 33" descr="C:/Users/Admin1/AppData/Roaming/PolarisOffice/ETemp/5024_9141648/fImage2242171584464.png"/>
+          <p:cNvPr id="34" name="그림 14"/>
+          <p:cNvPicPr>
+            <a:picLocks noChangeAspect="1"/>
+          </p:cNvPicPr>
+          <p:nvPr/>
+        </p:nvPicPr>
+        <p:blipFill rotWithShape="1">
+          <a:blip r:embed="rId5" cstate="print">
+            <a:extLst>
+              <a:ext uri="{28A0092B-C50C-407E-A947-70E740481C1C}">
+                <a14:useLocalDpi xmlns:a14="http://schemas.microsoft.com/office/drawing/2010/main" val="0"/>
+              </a:ext>
+            </a:extLst>
+          </a:blip>
+          <a:stretch>
+            <a:fillRect/>
+          </a:stretch>
+        </p:blipFill>
+        <p:spPr>
+          <a:xfrm rot="0">
+            <a:off x="1266825" y="3499485"/>
+            <a:ext cx="4112260" cy="1663700"/>
+          </a:xfrm>
+          <a:prstGeom prst="roundRect"/>
+          <a:solidFill>
+            <a:srgbClr val="EDEDED"/>
+          </a:solidFill>
+        </p:spPr>
+      </p:pic>
+      <p:pic>
+        <p:nvPicPr>
+          <p:cNvPr id="35" name="그림 1"/>
+          <p:cNvPicPr>
+            <a:picLocks noChangeAspect="1"/>
+          </p:cNvPicPr>
+          <p:nvPr/>
+        </p:nvPicPr>
+        <p:blipFill rotWithShape="1">
+          <a:blip r:embed="rId6" cstate="print">
+            <a:extLst>
+              <a:ext uri="{28A0092B-C50C-407E-A947-70E740481C1C}">
+                <a14:useLocalDpi xmlns:a14="http://schemas.microsoft.com/office/drawing/2010/main" val="0"/>
+              </a:ext>
+            </a:extLst>
+          </a:blip>
+          <a:stretch>
+            <a:fillRect/>
+          </a:stretch>
+        </p:blipFill>
+        <p:spPr>
+          <a:xfrm rot="0">
+            <a:off x="6816725" y="1288415"/>
+            <a:ext cx="4140835" cy="3783330"/>
+          </a:xfrm>
+          <a:prstGeom prst="rect"/>
+          <a:noFill/>
+        </p:spPr>
+      </p:pic>
+      <p:sp>
+        <p:nvSpPr>
+          <p:cNvPr id="36" name="텍스트 상자 2"/>
+          <p:cNvSpPr txBox="1">
+            <a:spLocks/>
+          </p:cNvSpPr>
+          <p:nvPr/>
+        </p:nvSpPr>
+        <p:spPr>
+          <a:xfrm rot="0">
+            <a:off x="6805295" y="5239385"/>
+            <a:ext cx="4143375" cy="954405"/>
+          </a:xfrm>
+          <a:prstGeom prst="rect"/>
+          <a:noFill/>
+          <a:ln w="0">
+            <a:noFill/>
+            <a:prstDash/>
+          </a:ln>
+        </p:spPr>
+        <p:txBody>
+          <a:bodyPr wrap="square" lIns="89535" tIns="46355" rIns="89535" bIns="46355" numCol="1" vert="horz" anchor="t">
+            <a:spAutoFit/>
+          </a:bodyPr>
+          <a:lstStyle/>
+          <a:p>
+            <a:pPr marL="0" indent="0" rtl="0" algn="l" defTabSz="914400" eaLnBrk="1" latinLnBrk="0" hangingPunct="1">
+              <a:buFontTx/>
+              <a:buNone/>
+            </a:pPr>
+            <a:r>
+              <a:rPr sz="2000" b="1">
+                <a:solidFill>
+                  <a:srgbClr val="0611F2"/>
+                </a:solidFill>
+                <a:latin typeface="맑은 고딕" charset="0"/>
+                <a:ea typeface="맑은 고딕" charset="0"/>
+              </a:rPr>
+              <a:t>2</a:t>
+            </a:r>
+            <a:r>
+              <a:rPr sz="2000" b="1">
+                <a:solidFill>
+                  <a:srgbClr val="0611F2"/>
+                </a:solidFill>
+                <a:latin typeface="맑은 고딕" charset="0"/>
+                <a:ea typeface="맑은 고딕" charset="0"/>
+              </a:rPr>
+              <a:t>2</a:t>
+            </a:r>
+            <a:r>
+              <a:rPr sz="2000" b="1">
+                <a:solidFill>
+                  <a:srgbClr val="0611F2"/>
+                </a:solidFill>
+                <a:latin typeface="맑은 고딕" charset="0"/>
+                <a:ea typeface="맑은 고딕" charset="0"/>
+              </a:rPr>
+              <a:t>. </a:t>
+            </a:r>
+            <a:r>
+              <a:rPr sz="1800">
+                <a:latin typeface="맑은 고딕" charset="0"/>
+                <a:ea typeface="맑은 고딕" charset="0"/>
+              </a:rPr>
+              <a:t>이</a:t>
+            </a:r>
+            <a:r>
+              <a:rPr lang="ko-KR" sz="1800">
+                <a:latin typeface="맑은 고딕" charset="0"/>
+                <a:ea typeface="맑은 고딕" charset="0"/>
+              </a:rPr>
+              <a:t>제</a:t>
+            </a:r>
+            <a:r>
+              <a:rPr sz="1800">
+                <a:latin typeface="맑은 고딕" charset="0"/>
+                <a:ea typeface="맑은 고딕" charset="0"/>
+              </a:rPr>
+              <a:t> </a:t>
+            </a:r>
+            <a:r>
+              <a:rPr sz="1800">
+                <a:latin typeface="맑은 고딕" charset="0"/>
+                <a:ea typeface="맑은 고딕" charset="0"/>
+              </a:rPr>
+              <a:t>Injured Run</a:t>
+            </a:r>
+            <a:r>
+              <a:rPr sz="1800">
+                <a:latin typeface="맑은 고딕" charset="0"/>
+                <a:ea typeface="맑은 고딕" charset="0"/>
+              </a:rPr>
+              <a:t> 애니메이션</a:t>
+            </a:r>
+            <a:r>
+              <a:rPr lang="ko-KR" sz="1800">
+                <a:latin typeface="맑은 고딕" charset="0"/>
+                <a:ea typeface="맑은 고딕" charset="0"/>
+              </a:rPr>
+              <a:t>을 </a:t>
+            </a:r>
+            <a:r>
+              <a:rPr lang="ko-KR" sz="1800">
+                <a:latin typeface="맑은 고딕" charset="0"/>
+                <a:ea typeface="맑은 고딕" charset="0"/>
+              </a:rPr>
+              <a:t>선택한 다음</a:t>
+            </a:r>
+            <a:r>
+              <a:rPr sz="1800">
+                <a:latin typeface="맑은 고딕" charset="0"/>
+                <a:ea typeface="맑은 고딕" charset="0"/>
+              </a:rPr>
+              <a:t> In Place를 선택하고 Download 합니다.</a:t>
+            </a:r>
+            <a:endParaRPr lang="ko-KR" altLang="en-US" sz="1800">
+              <a:latin typeface="맑은 고딕" charset="0"/>
+              <a:ea typeface="맑은 고딕" charset="0"/>
+            </a:endParaRPr>
+          </a:p>
+        </p:txBody>
+      </p:sp>
+    </p:spTree>
+  </p:cSld>
+  <p:clrMapOvr>
+    <a:masterClrMapping/>
+  </p:clrMapOvr>
+  <mc:AlternateContent xmlns:mc="http://schemas.openxmlformats.org/markup-compatibility/2006">
+    <mc:Choice xmlns:p14="http://schemas.microsoft.com/office/powerpoint/2010/main" Requires="p14">
+      <p:transition spd="slow" p14:dur="1000"/>
+    </mc:Choice>
+    <mc:Fallback>
+      <p:transition spd="slow"/>
+    </mc:Fallback>
+  </mc:AlternateContent>
+  <p:timing>
+    <p:tnLst>
+      <p:par>
+        <p:cTn id="1" dur="indefinite" restart="never" nodeType="tmRoot"/>
+      </p:par>
+    </p:tnLst>
+  </p:timing>
+</p:sld>
+</file>
+
+<file path=ppt/slides/slide9.xml><?xml version="1.0" encoding="utf-8"?>
+<p:sld xmlns:a="http://schemas.openxmlformats.org/drawingml/2006/main" xmlns:r="http://schemas.openxmlformats.org/officeDocument/2006/relationships" xmlns:p="http://schemas.openxmlformats.org/presentationml/2006/main" xmlns:p14="http://schemas.microsoft.com/office/powerpoint/2010/main">
+  <p:cSld>
+    <p:spTree>
+      <p:nvGrpSpPr>
+        <p:cNvPr id="1" name=""/>
+        <p:cNvGrpSpPr/>
+        <p:nvPr/>
+      </p:nvGrpSpPr>
+      <p:grpSpPr>
+        <a:xfrm>
+          <a:off x="0" y="0"/>
+          <a:ext cx="0" cy="0"/>
+          <a:chOff x="0" y="0"/>
+          <a:chExt cx="0" cy="0"/>
+        </a:xfrm>
+      </p:grpSpPr>
+      <p:sp>
+        <p:nvSpPr>
+          <p:cNvPr id="2" name="Rect 0"/>
+          <p:cNvSpPr txBox="1">
+            <a:spLocks/>
+          </p:cNvSpPr>
+          <p:nvPr/>
+        </p:nvSpPr>
+        <p:spPr>
+          <a:xfrm rot="0">
+            <a:off x="4331335" y="412115"/>
+            <a:ext cx="3528060" cy="554990"/>
+          </a:xfrm>
+          <a:prstGeom prst="rect"/>
+          <a:noFill/>
+          <a:ln w="0">
+            <a:noFill/>
+            <a:prstDash/>
+          </a:ln>
+        </p:spPr>
+        <p:txBody>
+          <a:bodyPr wrap="square" lIns="89535" tIns="46355" rIns="89535" bIns="46355" numCol="1" vert="horz" anchor="t">
+            <a:spAutoFit/>
+          </a:bodyPr>
+          <a:lstStyle/>
+          <a:p>
+            <a:pPr marL="0" indent="0" rtl="0" algn="l" defTabSz="914400" eaLnBrk="1" latinLnBrk="0" hangingPunct="1">
+              <a:buFontTx/>
+              <a:buNone/>
+            </a:pPr>
+            <a:r>
+              <a:rPr lang="ko-KR" sz="3000" b="1">
+                <a:solidFill>
+                  <a:schemeClr val="tx1"/>
+                </a:solidFill>
+                <a:latin typeface="맑은 고딕" charset="0"/>
+                <a:ea typeface="맑은 고딕" charset="0"/>
+              </a:rPr>
+              <a:t>아홉</a:t>
+            </a:r>
+            <a:r>
+              <a:rPr lang="ko-KR" sz="3000" b="1">
+                <a:solidFill>
+                  <a:schemeClr val="tx1"/>
+                </a:solidFill>
+                <a:latin typeface="맑은 고딕" charset="0"/>
+                <a:ea typeface="맑은 고딕" charset="0"/>
+              </a:rPr>
+              <a:t> 번째 튜토리얼</a:t>
+            </a:r>
+            <a:r>
+              <a:rPr sz="3000" b="1">
+                <a:solidFill>
+                  <a:schemeClr val="tx1"/>
+                </a:solidFill>
+                <a:latin typeface="맑은 고딕" charset="0"/>
+                <a:ea typeface="맑은 고딕" charset="0"/>
+              </a:rPr>
+              <a:t> </a:t>
+            </a:r>
+            <a:endParaRPr lang="ko-KR" altLang="en-US" sz="3000" b="1">
+              <a:solidFill>
+                <a:schemeClr val="tx1"/>
+              </a:solidFill>
+              <a:latin typeface="맑은 고딕" charset="0"/>
+              <a:ea typeface="맑은 고딕" charset="0"/>
+            </a:endParaRPr>
+          </a:p>
+        </p:txBody>
+      </p:sp>
+      <p:sp>
+        <p:nvSpPr>
+          <p:cNvPr id="33" name="Rect 0"/>
+          <p:cNvSpPr txBox="1">
+            <a:spLocks/>
+          </p:cNvSpPr>
+          <p:nvPr/>
+        </p:nvSpPr>
+        <p:spPr>
+          <a:xfrm rot="0">
+            <a:off x="6824980" y="2644140"/>
+            <a:ext cx="4173855" cy="956310"/>
+          </a:xfrm>
+          <a:prstGeom prst="rect"/>
+          <a:noFill/>
+        </p:spPr>
+        <p:txBody>
+          <a:bodyPr wrap="square" lIns="0" tIns="0" rIns="0" bIns="0" numCol="1" vert="horz" anchor="t">
+            <a:noAutofit/>
+          </a:bodyPr>
+          <a:lstStyle/>
+          <a:p>
+            <a:pPr marL="0" indent="0" rtl="0" algn="l" defTabSz="914400" eaLnBrk="1" latinLnBrk="0" hangingPunct="1">
+              <a:buFontTx/>
+              <a:buNone/>
+            </a:pPr>
+            <a:r>
+              <a:rPr sz="2000" b="1">
+                <a:solidFill>
+                  <a:srgbClr val="0611F2"/>
+                </a:solidFill>
+                <a:latin typeface="맑은 고딕" charset="0"/>
+                <a:ea typeface="맑은 고딕" charset="0"/>
+              </a:rPr>
+              <a:t>2</a:t>
+            </a:r>
+            <a:r>
+              <a:rPr lang="ko-KR" sz="2000" b="1">
+                <a:solidFill>
+                  <a:srgbClr val="0611F2"/>
+                </a:solidFill>
+                <a:latin typeface="맑은 고딕" charset="0"/>
+                <a:ea typeface="맑은 고딕" charset="0"/>
+              </a:rPr>
+              <a:t>4</a:t>
+            </a:r>
+            <a:r>
+              <a:rPr sz="2000" b="1">
+                <a:solidFill>
+                  <a:srgbClr val="0611F2"/>
+                </a:solidFill>
+                <a:latin typeface="맑은 고딕" charset="0"/>
+                <a:ea typeface="맑은 고딕" charset="0"/>
+              </a:rPr>
+              <a:t>. </a:t>
+            </a:r>
+            <a:r>
+              <a:rPr sz="1800">
+                <a:latin typeface="맑은 고딕" charset="0"/>
+                <a:ea typeface="맑은 고딕" charset="0"/>
+              </a:rPr>
+              <a:t>그</a:t>
+            </a:r>
+            <a:r>
+              <a:rPr lang="ko-KR" sz="1800">
+                <a:latin typeface="맑은 고딕" charset="0"/>
+                <a:ea typeface="맑은 고딕" charset="0"/>
+              </a:rPr>
+              <a:t>리고 </a:t>
+            </a:r>
+            <a:r>
+              <a:rPr sz="1800">
+                <a:latin typeface="맑은 고딕" charset="0"/>
+                <a:ea typeface="맑은 고딕" charset="0"/>
+              </a:rPr>
+              <a:t>애니메이션 파일을 유니티 프로젝트에 있</a:t>
+            </a:r>
+            <a:r>
+              <a:rPr lang="ko-KR" sz="1800">
+                <a:latin typeface="맑은 고딕" charset="0"/>
+                <a:ea typeface="맑은 고딕" charset="0"/>
+              </a:rPr>
+              <a:t>는 Animation 폴더에 저장합니다.</a:t>
+            </a:r>
+            <a:endParaRPr lang="ko-KR" altLang="en-US" sz="1800">
+              <a:latin typeface="맑은 고딕" charset="0"/>
+              <a:ea typeface="맑은 고딕" charset="0"/>
+            </a:endParaRPr>
+          </a:p>
+        </p:txBody>
+      </p:sp>
+      <p:pic>
+        <p:nvPicPr>
+          <p:cNvPr id="37" name="그림 3"/>
+          <p:cNvPicPr>
+            <a:picLocks noChangeAspect="1"/>
+          </p:cNvPicPr>
+          <p:nvPr/>
+        </p:nvPicPr>
+        <p:blipFill rotWithShape="1">
+          <a:blip r:embed="rId2" cstate="print">
+            <a:extLst>
+              <a:ext uri="{28A0092B-C50C-407E-A947-70E740481C1C}">
+                <a14:useLocalDpi xmlns:a14="http://schemas.microsoft.com/office/drawing/2010/main" val="0"/>
+              </a:ext>
+            </a:extLst>
+          </a:blip>
+          <a:stretch>
+            <a:fillRect/>
+          </a:stretch>
+        </p:blipFill>
+        <p:spPr>
+          <a:xfrm rot="0">
+            <a:off x="6824980" y="1544955"/>
+            <a:ext cx="907415" cy="791210"/>
+          </a:xfrm>
+          <a:prstGeom prst="roundRect"/>
+          <a:solidFill>
+            <a:srgbClr val="EDEDED"/>
+          </a:solidFill>
+        </p:spPr>
+      </p:pic>
+      <p:pic>
+        <p:nvPicPr>
+          <p:cNvPr id="38" name="그림 6"/>
+          <p:cNvPicPr>
+            <a:picLocks noChangeAspect="1"/>
+          </p:cNvPicPr>
+          <p:nvPr/>
+        </p:nvPicPr>
+        <p:blipFill rotWithShape="1">
+          <a:blip r:embed="rId3" cstate="print">
+            <a:extLst>
+              <a:ext uri="{28A0092B-C50C-407E-A947-70E740481C1C}">
+                <a14:useLocalDpi xmlns:a14="http://schemas.microsoft.com/office/drawing/2010/main" val="0"/>
+              </a:ext>
+            </a:extLst>
+          </a:blip>
+          <a:stretch>
+            <a:fillRect/>
+          </a:stretch>
+        </p:blipFill>
+        <p:spPr>
+          <a:xfrm rot="0">
+            <a:off x="8122285" y="1327785"/>
+            <a:ext cx="2864485" cy="1233170"/>
+          </a:xfrm>
+          <a:prstGeom prst="roundRect"/>
+          <a:solidFill>
+            <a:srgbClr val="EDEDED"/>
+          </a:solidFill>
+        </p:spPr>
+      </p:pic>
+      <p:pic>
+        <p:nvPicPr>
+          <p:cNvPr id="39" name="그림 9"/>
+          <p:cNvPicPr>
+            <a:picLocks noChangeAspect="1"/>
+          </p:cNvPicPr>
+          <p:nvPr/>
+        </p:nvPicPr>
+        <p:blipFill rotWithShape="1">
+          <a:blip r:embed="rId4" cstate="hqprint">
+            <a:extLst>
+              <a:ext uri="{28A0092B-C50C-407E-A947-70E740481C1C}">
+                <a14:useLocalDpi xmlns:a14="http://schemas.microsoft.com/office/drawing/2010/main"/>
+              </a:ext>
+            </a:extLst>
+          </a:blip>
+          <a:stretch>
+            <a:fillRect/>
+          </a:stretch>
+        </p:blipFill>
+        <p:spPr>
+          <a:xfrm rot="16200000">
+            <a:off x="7801610" y="1604645"/>
+            <a:ext cx="348615" cy="660400"/>
+          </a:xfrm>
+          <a:prstGeom prst="rect"/>
+          <a:noFill/>
+        </p:spPr>
+      </p:pic>
+      <p:sp>
+        <p:nvSpPr>
+          <p:cNvPr id="40" name="텍스트 상자 13"/>
+          <p:cNvSpPr txBox="1">
+            <a:spLocks/>
+          </p:cNvSpPr>
+          <p:nvPr/>
+        </p:nvSpPr>
+        <p:spPr>
+          <a:xfrm rot="0">
+            <a:off x="1268095" y="4726940"/>
+            <a:ext cx="4109720" cy="1508125"/>
+          </a:xfrm>
+          <a:prstGeom prst="rect"/>
+          <a:noFill/>
+          <a:ln w="0">
+            <a:noFill/>
+            <a:prstDash/>
+          </a:ln>
+        </p:spPr>
+        <p:txBody>
+          <a:bodyPr wrap="square" lIns="89535" tIns="46355" rIns="89535" bIns="46355" numCol="1" vert="horz" anchor="t">
+            <a:spAutoFit/>
+          </a:bodyPr>
+          <a:lstStyle/>
+          <a:p>
+            <a:pPr marL="0" indent="0" rtl="0" algn="l" defTabSz="914400" eaLnBrk="1" latinLnBrk="0" hangingPunct="1">
+              <a:buFontTx/>
+              <a:buNone/>
+            </a:pPr>
+            <a:r>
+              <a:rPr sz="2000" b="1">
+                <a:solidFill>
+                  <a:srgbClr val="0611F2"/>
+                </a:solidFill>
+                <a:latin typeface="맑은 고딕" charset="0"/>
+                <a:ea typeface="맑은 고딕" charset="0"/>
+              </a:rPr>
+              <a:t>23</a:t>
+            </a:r>
+            <a:r>
+              <a:rPr sz="2000" b="1">
+                <a:solidFill>
+                  <a:srgbClr val="0611F2"/>
+                </a:solidFill>
+                <a:latin typeface="맑은 고딕" charset="0"/>
+                <a:ea typeface="맑은 고딕" charset="0"/>
+              </a:rPr>
+              <a:t>. </a:t>
+            </a:r>
+            <a:r>
+              <a:rPr sz="1800">
+                <a:latin typeface="맑은 고딕" charset="0"/>
+                <a:ea typeface="맑은 고딕" charset="0"/>
+              </a:rPr>
+              <a:t>그</a:t>
+            </a:r>
+            <a:r>
+              <a:rPr lang="ko-KR" sz="1800">
+                <a:latin typeface="맑은 고딕" charset="0"/>
+                <a:ea typeface="맑은 고딕" charset="0"/>
+              </a:rPr>
+              <a:t>런 다음</a:t>
+            </a:r>
+            <a:r>
+              <a:rPr sz="1800">
+                <a:latin typeface="맑은 고딕" charset="0"/>
+                <a:ea typeface="맑은 고딕" charset="0"/>
+              </a:rPr>
+              <a:t> Format</a:t>
+            </a:r>
+            <a:r>
+              <a:rPr lang="ko-KR" sz="1800">
+                <a:latin typeface="맑은 고딕" charset="0"/>
+                <a:ea typeface="맑은 고딕" charset="0"/>
+              </a:rPr>
+              <a:t>을</a:t>
+            </a:r>
+            <a:r>
+              <a:rPr sz="1800">
+                <a:latin typeface="맑은 고딕" charset="0"/>
+                <a:ea typeface="맑은 고딕" charset="0"/>
+              </a:rPr>
+              <a:t> FBX for Unity(.fbx)로 설정합니다.</a:t>
+            </a:r>
+            <a:endParaRPr lang="ko-KR" altLang="en-US" sz="1800">
+              <a:latin typeface="맑은 고딕" charset="0"/>
+              <a:ea typeface="맑은 고딕" charset="0"/>
+            </a:endParaRPr>
+          </a:p>
+          <a:p>
+            <a:pPr marL="0" indent="0" rtl="0" algn="l" defTabSz="914400" eaLnBrk="1" latinLnBrk="0" hangingPunct="1">
+              <a:buFontTx/>
+              <a:buNone/>
+            </a:pPr>
+            <a:endParaRPr lang="ko-KR" altLang="en-US" sz="1800">
+              <a:latin typeface="맑은 고딕" charset="0"/>
+              <a:ea typeface="맑은 고딕" charset="0"/>
+            </a:endParaRPr>
+          </a:p>
+          <a:p>
+            <a:pPr marL="0" indent="0" rtl="0" algn="l" defTabSz="914400" eaLnBrk="1" latinLnBrk="0" hangingPunct="1">
+              <a:buFontTx/>
+              <a:buNone/>
+            </a:pPr>
+            <a:r>
+              <a:rPr sz="1800">
+                <a:latin typeface="맑은 고딕" charset="0"/>
+                <a:ea typeface="맑은 고딕" charset="0"/>
+              </a:rPr>
+              <a:t>그다</a:t>
+            </a:r>
+            <a:r>
+              <a:rPr lang="ko-KR" sz="1800">
+                <a:latin typeface="맑은 고딕" charset="0"/>
+                <a:ea typeface="맑은 고딕" charset="0"/>
+              </a:rPr>
+              <a:t>음</a:t>
+            </a:r>
+            <a:r>
+              <a:rPr sz="1800">
+                <a:latin typeface="맑은 고딕" charset="0"/>
+                <a:ea typeface="맑은 고딕" charset="0"/>
+              </a:rPr>
+              <a:t> Skin은 Whitout Skin으로 설정하</a:t>
+            </a:r>
+            <a:r>
+              <a:rPr lang="ko-KR" sz="1800">
+                <a:latin typeface="맑은 고딕" charset="0"/>
+                <a:ea typeface="맑은 고딕" charset="0"/>
+              </a:rPr>
+              <a:t>고</a:t>
+            </a:r>
+            <a:r>
+              <a:rPr sz="1800">
+                <a:latin typeface="맑은 고딕" charset="0"/>
+                <a:ea typeface="맑은 고딕" charset="0"/>
+              </a:rPr>
+              <a:t> Download</a:t>
+            </a:r>
+            <a:r>
+              <a:rPr lang="ko-KR" sz="1800">
+                <a:latin typeface="맑은 고딕" charset="0"/>
+                <a:ea typeface="맑은 고딕" charset="0"/>
+              </a:rPr>
+              <a:t>를 선택</a:t>
+            </a:r>
+            <a:r>
+              <a:rPr sz="1800">
+                <a:latin typeface="맑은 고딕" charset="0"/>
+                <a:ea typeface="맑은 고딕" charset="0"/>
+              </a:rPr>
+              <a:t>합니다.</a:t>
+            </a:r>
+            <a:endParaRPr lang="ko-KR" altLang="en-US" sz="1800">
+              <a:latin typeface="맑은 고딕" charset="0"/>
+              <a:ea typeface="맑은 고딕" charset="0"/>
+            </a:endParaRPr>
+          </a:p>
+        </p:txBody>
+      </p:sp>
+      <p:pic>
+        <p:nvPicPr>
+          <p:cNvPr id="41" name="그림 14"/>
           <p:cNvPicPr>
             <a:picLocks noChangeAspect="1"/>
           </p:cNvPicPr>
@@ -7239,17 +11303,46 @@
           </a:stretch>
         </p:blipFill>
         <p:spPr>
-          <a:xfrm rot="10800000">
-            <a:off x="7797800" y="1803400"/>
-            <a:ext cx="624840" cy="351155"/>
+          <a:xfrm rot="0">
+            <a:off x="1271905" y="1337945"/>
+            <a:ext cx="4107180" cy="3327400"/>
           </a:xfrm>
           <a:prstGeom prst="rect"/>
           <a:noFill/>
         </p:spPr>
       </p:pic>
-      <p:sp>
-        <p:nvSpPr>
-          <p:cNvPr id="16" name="텍스트 상자 34"/>
+      <p:pic>
+        <p:nvPicPr>
+          <p:cNvPr id="42" name="그림 15"/>
+          <p:cNvPicPr>
+            <a:picLocks noChangeAspect="1"/>
+          </p:cNvPicPr>
+          <p:nvPr/>
+        </p:nvPicPr>
+        <p:blipFill rotWithShape="1">
+          <a:blip r:embed="rId6" cstate="print">
+            <a:extLst>
+              <a:ext uri="{28A0092B-C50C-407E-A947-70E740481C1C}">
+                <a14:useLocalDpi xmlns:a14="http://schemas.microsoft.com/office/drawing/2010/main" val="0"/>
+              </a:ext>
+            </a:extLst>
+          </a:blip>
+          <a:stretch>
+            <a:fillRect/>
+          </a:stretch>
+        </p:blipFill>
+        <p:spPr>
+          <a:xfrm rot="0">
+            <a:off x="6821805" y="3682365"/>
+            <a:ext cx="4177030" cy="1555750"/>
+          </a:xfrm>
+          <a:prstGeom prst="rect"/>
+          <a:noFill/>
+        </p:spPr>
+      </p:pic>
+      <p:sp>
+        <p:nvSpPr>
+          <p:cNvPr id="43" name="텍스트 상자 16"/>
           <p:cNvSpPr txBox="1">
             <a:spLocks/>
           </p:cNvSpPr>
@@ -7257,15 +11350,19 @@
         </p:nvSpPr>
         <p:spPr>
           <a:xfrm rot="0">
-            <a:off x="6852285" y="2560320"/>
-            <a:ext cx="4096385" cy="861695"/>
+            <a:off x="6823075" y="5284470"/>
+            <a:ext cx="4175760" cy="954405"/>
           </a:xfrm>
           <a:prstGeom prst="rect"/>
           <a:noFill/>
-        </p:spPr>
-        <p:txBody>
-          <a:bodyPr wrap="square" lIns="0" tIns="0" rIns="0" bIns="0" vert="horz" anchor="t">
-            <a:noAutofit/>
+          <a:ln w="0">
+            <a:noFill/>
+            <a:prstDash/>
+          </a:ln>
+        </p:spPr>
+        <p:txBody>
+          <a:bodyPr wrap="square" lIns="89535" tIns="46355" rIns="89535" bIns="46355" numCol="1" vert="horz" anchor="t">
+            <a:spAutoFit/>
           </a:bodyPr>
           <a:lstStyle/>
           <a:p>
@@ -7281,63 +11378,52 @@
                 <a:latin typeface="맑은 고딕" charset="0"/>
                 <a:ea typeface="맑은 고딕" charset="0"/>
               </a:rPr>
-              <a:t>13. </a:t>
+              <a:t>25</a:t>
+            </a:r>
+            <a:r>
+              <a:rPr sz="2000" b="1">
+                <a:solidFill>
+                  <a:srgbClr val="0611F2"/>
+                </a:solidFill>
+                <a:latin typeface="맑은 고딕" charset="0"/>
+                <a:ea typeface="맑은 고딕" charset="0"/>
+              </a:rPr>
+              <a:t>. </a:t>
             </a:r>
             <a:r>
               <a:rPr sz="1800">
                 <a:latin typeface="맑은 고딕" charset="0"/>
                 <a:ea typeface="맑은 고딕" charset="0"/>
               </a:rPr>
-              <a:t>이제 </a:t>
+              <a:t>마지막</a:t>
+            </a:r>
+            <a:r>
+              <a:rPr lang="ko-KR" sz="1800">
+                <a:latin typeface="맑은 고딕" charset="0"/>
+                <a:ea typeface="맑은 고딕" charset="0"/>
+              </a:rPr>
+              <a:t>으로</a:t>
             </a:r>
             <a:r>
               <a:rPr sz="1800">
                 <a:latin typeface="맑은 고딕" charset="0"/>
                 <a:ea typeface="맑은 고딕" charset="0"/>
               </a:rPr>
-              <a:t>erika</a:t>
+              <a:t> 애니메이터 컨트롤러를 선택하여 </a:t>
+            </a:r>
+            <a:r>
+              <a:rPr lang="ko-KR" sz="1800">
+                <a:latin typeface="맑은 고딕" charset="0"/>
+                <a:ea typeface="맑은 고딕" charset="0"/>
+              </a:rPr>
+              <a:t>Other</a:t>
             </a:r>
             <a:r>
               <a:rPr sz="1800">
                 <a:latin typeface="맑은 고딕" charset="0"/>
                 <a:ea typeface="맑은 고딕" charset="0"/>
               </a:rPr>
-              <a:t>_</a:t>
-            </a:r>
-            <a:r>
-              <a:rPr sz="1800">
-                <a:latin typeface="맑은 고딕" charset="0"/>
-                <a:ea typeface="맑은 고딕" charset="0"/>
-              </a:rPr>
-              <a:t>a</a:t>
-            </a:r>
-            <a:r>
-              <a:rPr lang="ko-KR" sz="1800">
-                <a:latin typeface="맑은 고딕" charset="0"/>
-                <a:ea typeface="맑은 고딕" charset="0"/>
-              </a:rPr>
-              <a:t>rcher</a:t>
-            </a:r>
-            <a:r>
-              <a:rPr sz="1800">
-                <a:latin typeface="맑은 고딕" charset="0"/>
-                <a:ea typeface="맑은 고딕" charset="0"/>
-              </a:rPr>
-              <a:t> 오브젝트에 방금 생성한 </a:t>
-            </a:r>
-            <a:r>
-              <a:rPr sz="1800">
-                <a:latin typeface="맑은 고딕" charset="0"/>
-                <a:ea typeface="맑은 고딕" charset="0"/>
-              </a:rPr>
-              <a:t>Layer</a:t>
-            </a:r>
-            <a:r>
-              <a:rPr sz="1800">
-                <a:latin typeface="맑은 고딕" charset="0"/>
-                <a:ea typeface="맑은 고딕" charset="0"/>
-              </a:rPr>
-              <a:t> Animator Controller를 넣어줍니다.</a:t>
+              <a:t> Layer에 들어옵니다. </a:t>
             </a:r>
             <a:endParaRPr lang="ko-KR" altLang="en-US" sz="1800">
               <a:latin typeface="맑은 고딕" charset="0"/>

</xml_diff>